<commit_message>
Added simple example illustrating the use of dapper-dot-net
</commit_message>
<xml_diff>
--- a/persistingData/persistingData.pptx
+++ b/persistingData/persistingData.pptx
@@ -5,10 +5,10 @@
     <p:sldMasterId id="2147483648" r:id="rId1"/>
   </p:sldMasterIdLst>
   <p:notesMasterIdLst>
-    <p:notesMasterId r:id="rId10"/>
+    <p:notesMasterId r:id="rId13"/>
   </p:notesMasterIdLst>
   <p:handoutMasterIdLst>
-    <p:handoutMasterId r:id="rId11"/>
+    <p:handoutMasterId r:id="rId14"/>
   </p:handoutMasterIdLst>
   <p:sldIdLst>
     <p:sldId id="256" r:id="rId2"/>
@@ -19,6 +19,9 @@
     <p:sldId id="268" r:id="rId7"/>
     <p:sldId id="269" r:id="rId8"/>
     <p:sldId id="271" r:id="rId9"/>
+    <p:sldId id="276" r:id="rId10"/>
+    <p:sldId id="275" r:id="rId11"/>
+    <p:sldId id="277" r:id="rId12"/>
   </p:sldIdLst>
   <p:sldSz cx="9144000" cy="6858000" type="screen4x3"/>
   <p:notesSz cx="6858000" cy="9144000"/>
@@ -145,7 +148,7 @@
     </p:spTree>
     <p:extLst>
       <p:ext uri="{BB962C8B-B14F-4D97-AF65-F5344CB8AC3E}">
-        <p14:creationId xmlns:p14="http://schemas.microsoft.com/office/powerpoint/2010/main" xmlns="" val="2280443481"/>
+        <p14:creationId xmlns="" xmlns:p14="http://schemas.microsoft.com/office/powerpoint/2010/main" val="2280443481"/>
       </p:ext>
     </p:extLst>
   </p:cSld>
@@ -315,7 +318,7 @@
     </p:spTree>
     <p:extLst>
       <p:ext uri="{BB962C8B-B14F-4D97-AF65-F5344CB8AC3E}">
-        <p14:creationId xmlns:p14="http://schemas.microsoft.com/office/powerpoint/2010/main" xmlns="" val="1996866432"/>
+        <p14:creationId xmlns="" xmlns:p14="http://schemas.microsoft.com/office/powerpoint/2010/main" val="1996866432"/>
       </p:ext>
     </p:extLst>
   </p:cSld>
@@ -635,6 +638,69 @@
 </p:notes>
 </file>
 
+<file path=ppt/notesSlides/notesSlide4.xml><?xml version="1.0" encoding="utf-8"?>
+<p:notes xmlns:a="http://schemas.openxmlformats.org/drawingml/2006/main" xmlns:r="http://schemas.openxmlformats.org/officeDocument/2006/relationships" xmlns:p="http://schemas.openxmlformats.org/presentationml/2006/main">
+  <p:cSld>
+    <p:spTree>
+      <p:nvGrpSpPr>
+        <p:cNvPr id="1" name=""/>
+        <p:cNvGrpSpPr/>
+        <p:nvPr/>
+      </p:nvGrpSpPr>
+      <p:grpSpPr>
+        <a:xfrm>
+          <a:off x="0" y="0"/>
+          <a:ext cx="0" cy="0"/>
+          <a:chOff x="0" y="0"/>
+          <a:chExt cx="0" cy="0"/>
+        </a:xfrm>
+      </p:grpSpPr>
+      <p:sp>
+        <p:nvSpPr>
+          <p:cNvPr id="2" name="Slide Image Placeholder 1"/>
+          <p:cNvSpPr>
+            <a:spLocks noGrp="1" noRot="1" noChangeAspect="1"/>
+          </p:cNvSpPr>
+          <p:nvPr>
+            <p:ph type="sldImg"/>
+          </p:nvPr>
+        </p:nvSpPr>
+        <p:spPr>
+          <a:xfrm>
+            <a:off x="827088" y="592138"/>
+            <a:ext cx="5226050" cy="3919537"/>
+          </a:xfrm>
+        </p:spPr>
+      </p:sp>
+      <p:sp>
+        <p:nvSpPr>
+          <p:cNvPr id="3" name="Notes Placeholder 2"/>
+          <p:cNvSpPr>
+            <a:spLocks noGrp="1"/>
+          </p:cNvSpPr>
+          <p:nvPr>
+            <p:ph type="body" idx="1"/>
+          </p:nvPr>
+        </p:nvSpPr>
+        <p:spPr/>
+        <p:txBody>
+          <a:bodyPr>
+            <a:normAutofit/>
+          </a:bodyPr>
+          <a:lstStyle/>
+          <a:p>
+            <a:endParaRPr lang="en-US" dirty="0"/>
+          </a:p>
+        </p:txBody>
+      </p:sp>
+    </p:spTree>
+  </p:cSld>
+  <p:clrMapOvr>
+    <a:masterClrMapping/>
+  </p:clrMapOvr>
+</p:notes>
+</file>
+
 <file path=ppt/slideLayouts/slideLayout1.xml><?xml version="1.0" encoding="utf-8"?>
 <p:sldLayout xmlns:a="http://schemas.openxmlformats.org/drawingml/2006/main" xmlns:r="http://schemas.openxmlformats.org/officeDocument/2006/relationships" xmlns:p="http://schemas.openxmlformats.org/presentationml/2006/main" showMasterSp="0" preserve="1" userDrawn="1">
   <p:cSld name="Forside-hvit">
@@ -1061,7 +1127,7 @@
     </p:spTree>
     <p:extLst>
       <p:ext uri="{BB962C8B-B14F-4D97-AF65-F5344CB8AC3E}">
-        <p14:creationId xmlns:p14="http://schemas.microsoft.com/office/powerpoint/2010/main" xmlns="" val="1631701370"/>
+        <p14:creationId xmlns="" xmlns:p14="http://schemas.microsoft.com/office/powerpoint/2010/main" val="1631701370"/>
       </p:ext>
     </p:extLst>
   </p:cSld>
@@ -1382,7 +1448,7 @@
     </p:spTree>
     <p:extLst>
       <p:ext uri="{BB962C8B-B14F-4D97-AF65-F5344CB8AC3E}">
-        <p14:creationId xmlns:p14="http://schemas.microsoft.com/office/powerpoint/2010/main" xmlns="" val="2627694574"/>
+        <p14:creationId xmlns="" xmlns:p14="http://schemas.microsoft.com/office/powerpoint/2010/main" val="2627694574"/>
       </p:ext>
     </p:extLst>
   </p:cSld>
@@ -1701,7 +1767,7 @@
     </p:spTree>
     <p:extLst>
       <p:ext uri="{BB962C8B-B14F-4D97-AF65-F5344CB8AC3E}">
-        <p14:creationId xmlns:p14="http://schemas.microsoft.com/office/powerpoint/2010/main" xmlns="" val="2472564093"/>
+        <p14:creationId xmlns="" xmlns:p14="http://schemas.microsoft.com/office/powerpoint/2010/main" val="2472564093"/>
       </p:ext>
     </p:extLst>
   </p:cSld>
@@ -2186,7 +2252,7 @@
     </p:spTree>
     <p:extLst>
       <p:ext uri="{BB962C8B-B14F-4D97-AF65-F5344CB8AC3E}">
-        <p14:creationId xmlns:p14="http://schemas.microsoft.com/office/powerpoint/2010/main" xmlns="" val="844442129"/>
+        <p14:creationId xmlns="" xmlns:p14="http://schemas.microsoft.com/office/powerpoint/2010/main" val="844442129"/>
       </p:ext>
     </p:extLst>
   </p:cSld>
@@ -2516,7 +2582,7 @@
     </p:spTree>
     <p:extLst>
       <p:ext uri="{BB962C8B-B14F-4D97-AF65-F5344CB8AC3E}">
-        <p14:creationId xmlns:p14="http://schemas.microsoft.com/office/powerpoint/2010/main" xmlns="" val="1607786633"/>
+        <p14:creationId xmlns="" xmlns:p14="http://schemas.microsoft.com/office/powerpoint/2010/main" val="1607786633"/>
       </p:ext>
     </p:extLst>
   </p:cSld>
@@ -2846,7 +2912,7 @@
     </p:spTree>
     <p:extLst>
       <p:ext uri="{BB962C8B-B14F-4D97-AF65-F5344CB8AC3E}">
-        <p14:creationId xmlns:p14="http://schemas.microsoft.com/office/powerpoint/2010/main" xmlns="" val="3400319444"/>
+        <p14:creationId xmlns="" xmlns:p14="http://schemas.microsoft.com/office/powerpoint/2010/main" val="3400319444"/>
       </p:ext>
     </p:extLst>
   </p:cSld>
@@ -4716,7 +4782,7 @@
     </p:spTree>
     <p:extLst>
       <p:ext uri="{BB962C8B-B14F-4D97-AF65-F5344CB8AC3E}">
-        <p14:creationId xmlns:p14="http://schemas.microsoft.com/office/powerpoint/2010/main" xmlns="" val="1273682958"/>
+        <p14:creationId xmlns="" xmlns:p14="http://schemas.microsoft.com/office/powerpoint/2010/main" val="1273682958"/>
       </p:ext>
     </p:extLst>
   </p:cSld>
@@ -4821,7 +4887,7 @@
     </p:spTree>
     <p:extLst>
       <p:ext uri="{BB962C8B-B14F-4D97-AF65-F5344CB8AC3E}">
-        <p14:creationId xmlns:p14="http://schemas.microsoft.com/office/powerpoint/2010/main" xmlns="" val="3654216826"/>
+        <p14:creationId xmlns="" xmlns:p14="http://schemas.microsoft.com/office/powerpoint/2010/main" val="3654216826"/>
       </p:ext>
     </p:extLst>
   </p:cSld>
@@ -5077,7 +5143,7 @@
     </p:spTree>
     <p:extLst>
       <p:ext uri="{BB962C8B-B14F-4D97-AF65-F5344CB8AC3E}">
-        <p14:creationId xmlns:p14="http://schemas.microsoft.com/office/powerpoint/2010/main" xmlns="" val="2837040887"/>
+        <p14:creationId xmlns="" xmlns:p14="http://schemas.microsoft.com/office/powerpoint/2010/main" val="2837040887"/>
       </p:ext>
     </p:extLst>
   </p:cSld>
@@ -5110,7 +5176,7 @@
     </p:spTree>
     <p:extLst>
       <p:ext uri="{BB962C8B-B14F-4D97-AF65-F5344CB8AC3E}">
-        <p14:creationId xmlns:p14="http://schemas.microsoft.com/office/powerpoint/2010/main" xmlns="" val="3283581558"/>
+        <p14:creationId xmlns="" xmlns:p14="http://schemas.microsoft.com/office/powerpoint/2010/main" val="3283581558"/>
       </p:ext>
     </p:extLst>
   </p:cSld>
@@ -5424,7 +5490,7 @@
     </p:spTree>
     <p:extLst>
       <p:ext uri="{BB962C8B-B14F-4D97-AF65-F5344CB8AC3E}">
-        <p14:creationId xmlns:p14="http://schemas.microsoft.com/office/powerpoint/2010/main" xmlns="" val="3151533342"/>
+        <p14:creationId xmlns="" xmlns:p14="http://schemas.microsoft.com/office/powerpoint/2010/main" val="3151533342"/>
       </p:ext>
     </p:extLst>
   </p:cSld>
@@ -5567,7 +5633,7 @@
     </p:spTree>
     <p:extLst>
       <p:ext uri="{BB962C8B-B14F-4D97-AF65-F5344CB8AC3E}">
-        <p14:creationId xmlns:p14="http://schemas.microsoft.com/office/powerpoint/2010/main" xmlns="" val="894352273"/>
+        <p14:creationId xmlns="" xmlns:p14="http://schemas.microsoft.com/office/powerpoint/2010/main" val="894352273"/>
       </p:ext>
     </p:extLst>
   </p:cSld>
@@ -5733,7 +5799,7 @@
     </p:spTree>
     <p:extLst>
       <p:ext uri="{BB962C8B-B14F-4D97-AF65-F5344CB8AC3E}">
-        <p14:creationId xmlns:p14="http://schemas.microsoft.com/office/powerpoint/2010/main" xmlns="" val="351067674"/>
+        <p14:creationId xmlns="" xmlns:p14="http://schemas.microsoft.com/office/powerpoint/2010/main" val="351067674"/>
       </p:ext>
     </p:extLst>
   </p:cSld>
@@ -6053,7 +6119,7 @@
     </p:spTree>
     <p:extLst>
       <p:ext uri="{BB962C8B-B14F-4D97-AF65-F5344CB8AC3E}">
-        <p14:creationId xmlns:p14="http://schemas.microsoft.com/office/powerpoint/2010/main" xmlns="" val="3938044995"/>
+        <p14:creationId xmlns="" xmlns:p14="http://schemas.microsoft.com/office/powerpoint/2010/main" val="3938044995"/>
       </p:ext>
     </p:extLst>
   </p:cSld>
@@ -6639,7 +6705,7 @@
     </p:spTree>
     <p:extLst>
       <p:ext uri="{BB962C8B-B14F-4D97-AF65-F5344CB8AC3E}">
-        <p14:creationId xmlns:p14="http://schemas.microsoft.com/office/powerpoint/2010/main" xmlns="" val="3192118728"/>
+        <p14:creationId xmlns="" xmlns:p14="http://schemas.microsoft.com/office/powerpoint/2010/main" val="3192118728"/>
       </p:ext>
     </p:extLst>
   </p:cSld>
@@ -7037,7 +7103,7 @@
     </p:spTree>
     <p:extLst>
       <p:ext uri="{BB962C8B-B14F-4D97-AF65-F5344CB8AC3E}">
-        <p14:creationId xmlns:p14="http://schemas.microsoft.com/office/powerpoint/2010/main" xmlns="" val="2190527855"/>
+        <p14:creationId xmlns="" xmlns:p14="http://schemas.microsoft.com/office/powerpoint/2010/main" val="2190527855"/>
       </p:ext>
     </p:extLst>
   </p:cSld>
@@ -7834,7 +7900,7 @@
     </p:spTree>
     <p:extLst>
       <p:ext uri="{BB962C8B-B14F-4D97-AF65-F5344CB8AC3E}">
-        <p14:creationId xmlns:p14="http://schemas.microsoft.com/office/powerpoint/2010/main" xmlns="" val="69886873"/>
+        <p14:creationId xmlns="" xmlns:p14="http://schemas.microsoft.com/office/powerpoint/2010/main" val="69886873"/>
       </p:ext>
     </p:extLst>
   </p:cSld>
@@ -8925,7 +8991,7 @@
     </p:spTree>
     <p:extLst>
       <p:ext uri="{BB962C8B-B14F-4D97-AF65-F5344CB8AC3E}">
-        <p14:creationId xmlns:p14="http://schemas.microsoft.com/office/powerpoint/2010/main" xmlns="" val="593901232"/>
+        <p14:creationId xmlns="" xmlns:p14="http://schemas.microsoft.com/office/powerpoint/2010/main" val="593901232"/>
       </p:ext>
     </p:extLst>
   </p:cSld>
@@ -9181,7 +9247,7 @@
     </p:spTree>
     <p:extLst>
       <p:ext uri="{BB962C8B-B14F-4D97-AF65-F5344CB8AC3E}">
-        <p14:creationId xmlns:p14="http://schemas.microsoft.com/office/powerpoint/2010/main" xmlns="" val="925662914"/>
+        <p14:creationId xmlns="" xmlns:p14="http://schemas.microsoft.com/office/powerpoint/2010/main" val="925662914"/>
       </p:ext>
     </p:extLst>
   </p:cSld>
@@ -9423,7 +9489,7 @@
     </p:spTree>
     <p:extLst>
       <p:ext uri="{BB962C8B-B14F-4D97-AF65-F5344CB8AC3E}">
-        <p14:creationId xmlns:p14="http://schemas.microsoft.com/office/powerpoint/2010/main" xmlns="" val="2463004899"/>
+        <p14:creationId xmlns="" xmlns:p14="http://schemas.microsoft.com/office/powerpoint/2010/main" val="2463004899"/>
       </p:ext>
     </p:extLst>
   </p:cSld>
@@ -9853,9 +9919,606 @@
     </p:spTree>
     <p:extLst>
       <p:ext uri="{BB962C8B-B14F-4D97-AF65-F5344CB8AC3E}">
-        <p14:creationId xmlns:p14="http://schemas.microsoft.com/office/powerpoint/2010/main" xmlns="" val="1193520387"/>
+        <p14:creationId xmlns="" xmlns:p14="http://schemas.microsoft.com/office/powerpoint/2010/main" val="1193520387"/>
       </p:ext>
     </p:extLst>
+  </p:cSld>
+  <p:clrMapOvr>
+    <a:masterClrMapping/>
+  </p:clrMapOvr>
+  <p:transition>
+    <p:fade thruBlk="1"/>
+  </p:transition>
+  <p:timing>
+    <p:tnLst>
+      <p:par>
+        <p:cTn id="1" dur="indefinite" restart="never" nodeType="tmRoot"/>
+      </p:par>
+    </p:tnLst>
+  </p:timing>
+</p:sld>
+</file>
+
+<file path=ppt/slides/slide10.xml><?xml version="1.0" encoding="utf-8"?>
+<p:sld xmlns:a="http://schemas.openxmlformats.org/drawingml/2006/main" xmlns:r="http://schemas.openxmlformats.org/officeDocument/2006/relationships" xmlns:p="http://schemas.openxmlformats.org/presentationml/2006/main">
+  <p:cSld>
+    <p:spTree>
+      <p:nvGrpSpPr>
+        <p:cNvPr id="1" name=""/>
+        <p:cNvGrpSpPr/>
+        <p:nvPr/>
+      </p:nvGrpSpPr>
+      <p:grpSpPr>
+        <a:xfrm>
+          <a:off x="0" y="0"/>
+          <a:ext cx="0" cy="0"/>
+          <a:chOff x="0" y="0"/>
+          <a:chExt cx="0" cy="0"/>
+        </a:xfrm>
+      </p:grpSpPr>
+      <p:sp>
+        <p:nvSpPr>
+          <p:cNvPr id="2" name="Title 1"/>
+          <p:cNvSpPr>
+            <a:spLocks noGrp="1"/>
+          </p:cNvSpPr>
+          <p:nvPr>
+            <p:ph type="title"/>
+          </p:nvPr>
+        </p:nvSpPr>
+        <p:spPr>
+          <a:xfrm>
+            <a:off x="321623" y="418905"/>
+            <a:ext cx="1678345" cy="307777"/>
+          </a:xfrm>
+        </p:spPr>
+        <p:txBody>
+          <a:bodyPr/>
+          <a:lstStyle/>
+          <a:p>
+            <a:r>
+              <a:rPr lang="nb-NO" dirty="0" smtClean="0"/>
+              <a:t>Microorm</a:t>
+            </a:r>
+            <a:endParaRPr lang="en-US" dirty="0"/>
+          </a:p>
+        </p:txBody>
+      </p:sp>
+      <p:sp>
+        <p:nvSpPr>
+          <p:cNvPr id="3" name="Slide Number Placeholder 2"/>
+          <p:cNvSpPr>
+            <a:spLocks noGrp="1"/>
+          </p:cNvSpPr>
+          <p:nvPr>
+            <p:ph type="sldNum" sz="quarter" idx="10"/>
+          </p:nvPr>
+        </p:nvSpPr>
+        <p:spPr/>
+        <p:txBody>
+          <a:bodyPr/>
+          <a:lstStyle/>
+          <a:p>
+            <a:fld id="{FF67BF5B-7344-D747-A0C2-CBD7B2ACBC85}" type="slidenum">
+              <a:rPr lang="en-US" smtClean="0"/>
+              <a:pPr/>
+              <a:t>10</a:t>
+            </a:fld>
+            <a:endParaRPr lang="en-US" dirty="0"/>
+          </a:p>
+        </p:txBody>
+      </p:sp>
+      <p:pic>
+        <p:nvPicPr>
+          <p:cNvPr id="1026" name="Picture 2" descr="Logo"/>
+          <p:cNvPicPr>
+            <a:picLocks noChangeAspect="1" noChangeArrowheads="1"/>
+          </p:cNvPicPr>
+          <p:nvPr/>
+        </p:nvPicPr>
+        <p:blipFill>
+          <a:blip r:embed="rId2"/>
+          <a:srcRect/>
+          <a:stretch>
+            <a:fillRect/>
+          </a:stretch>
+        </p:blipFill>
+        <p:spPr bwMode="auto">
+          <a:xfrm>
+            <a:off x="499873" y="3837181"/>
+            <a:ext cx="457200" cy="457200"/>
+          </a:xfrm>
+          <a:prstGeom prst="rect">
+            <a:avLst/>
+          </a:prstGeom>
+          <a:noFill/>
+        </p:spPr>
+      </p:pic>
+      <p:sp>
+        <p:nvSpPr>
+          <p:cNvPr id="6" name="TextBox 5"/>
+          <p:cNvSpPr txBox="1"/>
+          <p:nvPr/>
+        </p:nvSpPr>
+        <p:spPr>
+          <a:xfrm>
+            <a:off x="992741" y="3924642"/>
+            <a:ext cx="2529860" cy="615553"/>
+          </a:xfrm>
+          <a:prstGeom prst="rect">
+            <a:avLst/>
+          </a:prstGeom>
+          <a:noFill/>
+        </p:spPr>
+        <p:txBody>
+          <a:bodyPr wrap="none" rtlCol="0">
+            <a:spAutoFit/>
+          </a:bodyPr>
+          <a:lstStyle/>
+          <a:p>
+            <a:pPr>
+              <a:spcBef>
+                <a:spcPts val="600"/>
+              </a:spcBef>
+              <a:spcAft>
+                <a:spcPts val="400"/>
+              </a:spcAft>
+            </a:pPr>
+            <a:r>
+              <a:rPr lang="nb-NO" sz="2400" dirty="0" smtClean="0">
+                <a:solidFill>
+                  <a:schemeClr val="accent1"/>
+                </a:solidFill>
+              </a:rPr>
+              <a:t>dapper-dot-net</a:t>
+            </a:r>
+            <a:r>
+              <a:rPr lang="en-US" sz="2400" dirty="0" smtClean="0">
+                <a:solidFill>
+                  <a:schemeClr val="accent1"/>
+                </a:solidFill>
+              </a:rPr>
+              <a:t/>
+            </a:r>
+            <a:br>
+              <a:rPr lang="en-US" sz="2400" dirty="0" smtClean="0">
+                <a:solidFill>
+                  <a:schemeClr val="accent1"/>
+                </a:solidFill>
+              </a:rPr>
+            </a:br>
+            <a:r>
+              <a:rPr lang="en-US" sz="1000" dirty="0" smtClean="0">
+                <a:solidFill>
+                  <a:schemeClr val="accent1"/>
+                </a:solidFill>
+              </a:rPr>
+              <a:t>Simple SQL Object </a:t>
+            </a:r>
+            <a:r>
+              <a:rPr lang="en-US" sz="1000" dirty="0" err="1" smtClean="0">
+                <a:solidFill>
+                  <a:schemeClr val="accent1"/>
+                </a:solidFill>
+              </a:rPr>
+              <a:t>Mapper</a:t>
+            </a:r>
+            <a:r>
+              <a:rPr lang="en-US" sz="1000" dirty="0" smtClean="0">
+                <a:solidFill>
+                  <a:schemeClr val="accent1"/>
+                </a:solidFill>
+              </a:rPr>
+              <a:t> for ADO.NET</a:t>
+            </a:r>
+            <a:endParaRPr lang="nb-NO" sz="1000" dirty="0" smtClean="0">
+              <a:solidFill>
+                <a:schemeClr val="accent1"/>
+              </a:solidFill>
+            </a:endParaRPr>
+          </a:p>
+        </p:txBody>
+      </p:sp>
+      <p:sp>
+        <p:nvSpPr>
+          <p:cNvPr id="7" name="TextBox 6"/>
+          <p:cNvSpPr txBox="1"/>
+          <p:nvPr/>
+        </p:nvSpPr>
+        <p:spPr>
+          <a:xfrm>
+            <a:off x="321623" y="999450"/>
+            <a:ext cx="8102827" cy="2026196"/>
+          </a:xfrm>
+          <a:prstGeom prst="rect">
+            <a:avLst/>
+          </a:prstGeom>
+          <a:noFill/>
+        </p:spPr>
+        <p:txBody>
+          <a:bodyPr wrap="square" rtlCol="0">
+            <a:spAutoFit/>
+          </a:bodyPr>
+          <a:lstStyle/>
+          <a:p>
+            <a:pPr>
+              <a:spcBef>
+                <a:spcPts val="600"/>
+              </a:spcBef>
+              <a:spcAft>
+                <a:spcPts val="400"/>
+              </a:spcAft>
+              <a:buFont typeface="Wingdings" pitchFamily="2" charset="2"/>
+              <a:buChar char="ü"/>
+            </a:pPr>
+            <a:r>
+              <a:rPr lang="nb-NO" sz="1400" dirty="0" smtClean="0"/>
+              <a:t> Enkelhet</a:t>
+            </a:r>
+          </a:p>
+          <a:p>
+            <a:pPr>
+              <a:spcBef>
+                <a:spcPts val="600"/>
+              </a:spcBef>
+              <a:spcAft>
+                <a:spcPts val="400"/>
+              </a:spcAft>
+              <a:buFont typeface="Wingdings" pitchFamily="2" charset="2"/>
+              <a:buChar char="ü"/>
+            </a:pPr>
+            <a:r>
+              <a:rPr lang="nb-NO" sz="1400" dirty="0" smtClean="0"/>
+              <a:t> </a:t>
+            </a:r>
+            <a:r>
+              <a:rPr lang="nb-NO" sz="1400" dirty="0" smtClean="0"/>
+              <a:t>Open-source</a:t>
+            </a:r>
+          </a:p>
+          <a:p>
+            <a:pPr>
+              <a:spcBef>
+                <a:spcPts val="600"/>
+              </a:spcBef>
+              <a:spcAft>
+                <a:spcPts val="400"/>
+              </a:spcAft>
+              <a:buFont typeface="Wingdings" pitchFamily="2" charset="2"/>
+              <a:buChar char="ü"/>
+            </a:pPr>
+            <a:r>
+              <a:rPr lang="nb-NO" sz="1400" dirty="0" smtClean="0"/>
+              <a:t> </a:t>
+            </a:r>
+            <a:r>
+              <a:rPr lang="nb-NO" sz="1400" dirty="0" smtClean="0"/>
+              <a:t>Single-file</a:t>
+            </a:r>
+          </a:p>
+          <a:p>
+            <a:pPr>
+              <a:spcBef>
+                <a:spcPts val="600"/>
+              </a:spcBef>
+              <a:spcAft>
+                <a:spcPts val="400"/>
+              </a:spcAft>
+              <a:buFont typeface="Wingdings" pitchFamily="2" charset="2"/>
+              <a:buChar char="ü"/>
+            </a:pPr>
+            <a:r>
+              <a:rPr lang="nb-NO" sz="1400" dirty="0" smtClean="0"/>
+              <a:t> </a:t>
+            </a:r>
+            <a:r>
+              <a:rPr lang="nb-NO" sz="1400" dirty="0" smtClean="0"/>
+              <a:t>Ytelse i fokus</a:t>
+            </a:r>
+          </a:p>
+          <a:p>
+            <a:pPr>
+              <a:spcBef>
+                <a:spcPts val="600"/>
+              </a:spcBef>
+              <a:spcAft>
+                <a:spcPts val="400"/>
+              </a:spcAft>
+              <a:buFont typeface="Wingdings" pitchFamily="2" charset="2"/>
+              <a:buChar char="ü"/>
+            </a:pPr>
+            <a:r>
+              <a:rPr lang="nb-NO" sz="1400" dirty="0" smtClean="0"/>
+              <a:t> </a:t>
+            </a:r>
+            <a:r>
+              <a:rPr lang="nb-NO" sz="1400" dirty="0" smtClean="0"/>
+              <a:t>Ren SQL</a:t>
+            </a:r>
+          </a:p>
+          <a:p>
+            <a:pPr>
+              <a:spcBef>
+                <a:spcPts val="600"/>
+              </a:spcBef>
+              <a:spcAft>
+                <a:spcPts val="400"/>
+              </a:spcAft>
+              <a:buFont typeface="Wingdings" pitchFamily="2" charset="2"/>
+              <a:buChar char="ü"/>
+            </a:pPr>
+            <a:endParaRPr lang="nb-NO" sz="1400" dirty="0" smtClean="0"/>
+          </a:p>
+        </p:txBody>
+      </p:sp>
+    </p:spTree>
+  </p:cSld>
+  <p:clrMapOvr>
+    <a:masterClrMapping/>
+  </p:clrMapOvr>
+  <p:transition>
+    <p:fade thruBlk="1"/>
+  </p:transition>
+</p:sld>
+</file>
+
+<file path=ppt/slides/slide11.xml><?xml version="1.0" encoding="utf-8"?>
+<p:sld xmlns:a="http://schemas.openxmlformats.org/drawingml/2006/main" xmlns:r="http://schemas.openxmlformats.org/officeDocument/2006/relationships" xmlns:p="http://schemas.openxmlformats.org/presentationml/2006/main">
+  <p:cSld>
+    <p:bg>
+      <p:bgPr>
+        <a:solidFill>
+          <a:schemeClr val="accent1"/>
+        </a:solidFill>
+        <a:effectLst/>
+      </p:bgPr>
+    </p:bg>
+    <p:spTree>
+      <p:nvGrpSpPr>
+        <p:cNvPr id="1" name=""/>
+        <p:cNvGrpSpPr/>
+        <p:nvPr/>
+      </p:nvGrpSpPr>
+      <p:grpSpPr>
+        <a:xfrm>
+          <a:off x="0" y="0"/>
+          <a:ext cx="0" cy="0"/>
+          <a:chOff x="0" y="0"/>
+          <a:chExt cx="0" cy="0"/>
+        </a:xfrm>
+      </p:grpSpPr>
+      <p:sp>
+        <p:nvSpPr>
+          <p:cNvPr id="2" name="Title 1"/>
+          <p:cNvSpPr>
+            <a:spLocks noGrp="1"/>
+          </p:cNvSpPr>
+          <p:nvPr>
+            <p:ph type="title"/>
+          </p:nvPr>
+        </p:nvSpPr>
+        <p:spPr>
+          <a:xfrm>
+            <a:off x="321623" y="418905"/>
+            <a:ext cx="1466748" cy="307777"/>
+          </a:xfrm>
+          <a:solidFill>
+            <a:schemeClr val="accent1"/>
+          </a:solidFill>
+        </p:spPr>
+        <p:txBody>
+          <a:bodyPr/>
+          <a:lstStyle/>
+          <a:p>
+            <a:r>
+              <a:rPr lang="nb-NO" dirty="0" smtClean="0">
+                <a:solidFill>
+                  <a:schemeClr val="bg1"/>
+                </a:solidFill>
+              </a:rPr>
+              <a:t>Oppgave </a:t>
+            </a:r>
+            <a:endParaRPr lang="en-US" dirty="0">
+              <a:solidFill>
+                <a:schemeClr val="bg1"/>
+              </a:solidFill>
+            </a:endParaRPr>
+          </a:p>
+        </p:txBody>
+      </p:sp>
+      <p:sp>
+        <p:nvSpPr>
+          <p:cNvPr id="3" name="Slide Number Placeholder 2"/>
+          <p:cNvSpPr>
+            <a:spLocks noGrp="1"/>
+          </p:cNvSpPr>
+          <p:nvPr>
+            <p:ph type="sldNum" sz="quarter" idx="10"/>
+          </p:nvPr>
+        </p:nvSpPr>
+        <p:spPr>
+          <a:solidFill>
+            <a:schemeClr val="accent1"/>
+          </a:solidFill>
+        </p:spPr>
+        <p:txBody>
+          <a:bodyPr/>
+          <a:lstStyle/>
+          <a:p>
+            <a:fld id="{FF67BF5B-7344-D747-A0C2-CBD7B2ACBC85}" type="slidenum">
+              <a:rPr lang="en-US" smtClean="0">
+                <a:solidFill>
+                  <a:schemeClr val="bg1"/>
+                </a:solidFill>
+              </a:rPr>
+              <a:pPr/>
+              <a:t>11</a:t>
+            </a:fld>
+            <a:endParaRPr lang="en-US" dirty="0">
+              <a:solidFill>
+                <a:schemeClr val="bg1"/>
+              </a:solidFill>
+            </a:endParaRPr>
+          </a:p>
+        </p:txBody>
+      </p:sp>
+      <p:sp>
+        <p:nvSpPr>
+          <p:cNvPr id="5" name="TextBox 4"/>
+          <p:cNvSpPr txBox="1"/>
+          <p:nvPr/>
+        </p:nvSpPr>
+        <p:spPr>
+          <a:xfrm>
+            <a:off x="321623" y="935335"/>
+            <a:ext cx="8102827" cy="3693319"/>
+          </a:xfrm>
+          <a:prstGeom prst="rect">
+            <a:avLst/>
+          </a:prstGeom>
+          <a:noFill/>
+        </p:spPr>
+        <p:txBody>
+          <a:bodyPr wrap="square" rtlCol="0">
+            <a:spAutoFit/>
+          </a:bodyPr>
+          <a:lstStyle/>
+          <a:p>
+            <a:pPr algn="just"/>
+            <a:r>
+              <a:rPr lang="nb-NO" dirty="0" smtClean="0">
+                <a:solidFill>
+                  <a:schemeClr val="bg1"/>
+                </a:solidFill>
+              </a:rPr>
+              <a:t>Oppgaven er lik som oppgave 1, eneste forskjell er at vi skal bruke dapper-dot-net for å kommunisere med databasen.</a:t>
+            </a:r>
+          </a:p>
+          <a:p>
+            <a:pPr algn="just"/>
+            <a:endParaRPr lang="nb-NO" dirty="0" smtClean="0">
+              <a:solidFill>
+                <a:schemeClr val="bg1"/>
+              </a:solidFill>
+            </a:endParaRPr>
+          </a:p>
+          <a:p>
+            <a:pPr algn="just"/>
+            <a:r>
+              <a:rPr lang="nb-NO" dirty="0" smtClean="0">
+                <a:solidFill>
+                  <a:schemeClr val="bg1"/>
+                </a:solidFill>
+              </a:rPr>
+              <a:t>Detaljer om Dapper finnes her:</a:t>
+            </a:r>
+          </a:p>
+          <a:p>
+            <a:pPr algn="just"/>
+            <a:endParaRPr lang="nb-NO" dirty="0" smtClean="0">
+              <a:solidFill>
+                <a:schemeClr val="bg1"/>
+              </a:solidFill>
+            </a:endParaRPr>
+          </a:p>
+          <a:p>
+            <a:pPr algn="just"/>
+            <a:r>
+              <a:rPr lang="en-US" dirty="0" smtClean="0">
+                <a:hlinkClick r:id="rId3"/>
+              </a:rPr>
+              <a:t>http://code.google.com/p/dapper-dot-net</a:t>
+            </a:r>
+            <a:r>
+              <a:rPr lang="en-US" dirty="0" smtClean="0">
+                <a:hlinkClick r:id="rId3"/>
+              </a:rPr>
+              <a:t>/</a:t>
+            </a:r>
+            <a:endParaRPr lang="en-US" dirty="0" smtClean="0"/>
+          </a:p>
+          <a:p>
+            <a:pPr algn="just"/>
+            <a:endParaRPr lang="nb-NO" dirty="0" smtClean="0">
+              <a:solidFill>
+                <a:schemeClr val="bg1"/>
+              </a:solidFill>
+            </a:endParaRPr>
+          </a:p>
+          <a:p>
+            <a:pPr algn="just"/>
+            <a:r>
+              <a:rPr lang="nb-NO" dirty="0" smtClean="0">
+                <a:solidFill>
+                  <a:schemeClr val="bg1"/>
+                </a:solidFill>
+              </a:rPr>
+              <a:t>Dapper er tilgjengelig som nuget pakke</a:t>
+            </a:r>
+          </a:p>
+          <a:p>
+            <a:pPr algn="just"/>
+            <a:endParaRPr lang="nb-NO" dirty="0" smtClean="0">
+              <a:solidFill>
+                <a:schemeClr val="bg1"/>
+              </a:solidFill>
+            </a:endParaRPr>
+          </a:p>
+          <a:p>
+            <a:pPr algn="just"/>
+            <a:r>
+              <a:rPr lang="nb-NO" dirty="0" smtClean="0">
+                <a:solidFill>
+                  <a:schemeClr val="bg1"/>
+                </a:solidFill>
+                <a:latin typeface="Consolas" pitchFamily="49" charset="0"/>
+                <a:cs typeface="Consolas" pitchFamily="49" charset="0"/>
+              </a:rPr>
+              <a:t>PM&gt; Install-Package Dapper</a:t>
+            </a:r>
+            <a:endParaRPr lang="nb-NO" dirty="0" smtClean="0">
+              <a:solidFill>
+                <a:schemeClr val="bg1"/>
+              </a:solidFill>
+              <a:latin typeface="Consolas" pitchFamily="49" charset="0"/>
+              <a:cs typeface="Consolas" pitchFamily="49" charset="0"/>
+            </a:endParaRPr>
+          </a:p>
+          <a:p>
+            <a:pPr algn="just"/>
+            <a:endParaRPr lang="nb-NO" dirty="0" smtClean="0">
+              <a:solidFill>
+                <a:schemeClr val="bg1"/>
+              </a:solidFill>
+            </a:endParaRPr>
+          </a:p>
+          <a:p>
+            <a:pPr algn="just"/>
+            <a:endParaRPr lang="nb-NO" sz="1200" i="1" dirty="0" smtClean="0">
+              <a:solidFill>
+                <a:schemeClr val="bg1"/>
+              </a:solidFill>
+            </a:endParaRPr>
+          </a:p>
+          <a:p>
+            <a:pPr algn="just"/>
+            <a:endParaRPr lang="nb-NO" sz="1200" i="1" dirty="0" smtClean="0">
+              <a:solidFill>
+                <a:schemeClr val="bg1"/>
+              </a:solidFill>
+            </a:endParaRPr>
+          </a:p>
+          <a:p>
+            <a:pPr algn="just"/>
+            <a:endParaRPr lang="nb-NO" sz="1200" i="1" dirty="0" smtClean="0">
+              <a:solidFill>
+                <a:schemeClr val="bg1"/>
+              </a:solidFill>
+            </a:endParaRPr>
+          </a:p>
+        </p:txBody>
+      </p:sp>
+    </p:spTree>
   </p:cSld>
   <p:clrMapOvr>
     <a:masterClrMapping/>
@@ -9976,7 +10639,11 @@
             </a:pPr>
             <a:r>
               <a:rPr lang="nb-NO" sz="1400" dirty="0" smtClean="0"/>
-              <a:t> ADO.NET</a:t>
+              <a:t> </a:t>
+            </a:r>
+            <a:r>
+              <a:rPr lang="nb-NO" sz="1400" dirty="0" smtClean="0"/>
+              <a:t>ADO.NET</a:t>
             </a:r>
           </a:p>
           <a:p>
@@ -9992,7 +10659,7 @@
             </a:pPr>
             <a:r>
               <a:rPr lang="nb-NO" sz="1400" dirty="0" smtClean="0"/>
-              <a:t>Object Relational Mapping</a:t>
+              <a:t>Micro ORM</a:t>
             </a:r>
           </a:p>
           <a:p>
@@ -10008,7 +10675,7 @@
             </a:pPr>
             <a:r>
               <a:rPr lang="nb-NO" sz="1400" dirty="0" smtClean="0"/>
-              <a:t> Entity Framework</a:t>
+              <a:t> Dapper</a:t>
             </a:r>
           </a:p>
           <a:p>
@@ -10024,8 +10691,13 @@
             </a:pPr>
             <a:r>
               <a:rPr lang="nb-NO" sz="1400" dirty="0" smtClean="0"/>
-              <a:t> NHibernate</a:t>
-            </a:r>
+              <a:t> </a:t>
+            </a:r>
+            <a:r>
+              <a:rPr lang="nb-NO" sz="1400" dirty="0" smtClean="0"/>
+              <a:t>PetaPOCO</a:t>
+            </a:r>
+            <a:endParaRPr lang="nb-NO" sz="1400" dirty="0" smtClean="0"/>
           </a:p>
           <a:p>
             <a:pPr>
@@ -10040,7 +10712,7 @@
             </a:pPr>
             <a:r>
               <a:rPr lang="nb-NO" sz="1400" dirty="0" smtClean="0"/>
-              <a:t>Micro ORM</a:t>
+              <a:t>Object Relational Mapping</a:t>
             </a:r>
           </a:p>
           <a:p>
@@ -10056,7 +10728,7 @@
             </a:pPr>
             <a:r>
               <a:rPr lang="nb-NO" sz="1400" dirty="0" smtClean="0"/>
-              <a:t> Dapper</a:t>
+              <a:t> Entity Framework</a:t>
             </a:r>
           </a:p>
           <a:p>
@@ -10072,8 +10744,13 @@
             </a:pPr>
             <a:r>
               <a:rPr lang="nb-NO" sz="1400" dirty="0" smtClean="0"/>
-              <a:t> PetaPOCO</a:t>
-            </a:r>
+              <a:t> </a:t>
+            </a:r>
+            <a:r>
+              <a:rPr lang="nb-NO" sz="1400" dirty="0" smtClean="0"/>
+              <a:t>NHibernate</a:t>
+            </a:r>
+            <a:endParaRPr lang="nb-NO" sz="1400" dirty="0" smtClean="0"/>
           </a:p>
         </p:txBody>
       </p:sp>
@@ -16237,6 +16914,86 @@
       </p:par>
     </p:tnLst>
   </p:timing>
+</p:sld>
+</file>
+
+<file path=ppt/slides/slide9.xml><?xml version="1.0" encoding="utf-8"?>
+<p:sld xmlns:a="http://schemas.openxmlformats.org/drawingml/2006/main" xmlns:r="http://schemas.openxmlformats.org/officeDocument/2006/relationships" xmlns:p="http://schemas.openxmlformats.org/presentationml/2006/main">
+  <p:cSld>
+    <p:spTree>
+      <p:nvGrpSpPr>
+        <p:cNvPr id="1" name=""/>
+        <p:cNvGrpSpPr/>
+        <p:nvPr/>
+      </p:nvGrpSpPr>
+      <p:grpSpPr>
+        <a:xfrm>
+          <a:off x="0" y="0"/>
+          <a:ext cx="0" cy="0"/>
+          <a:chOff x="0" y="0"/>
+          <a:chExt cx="0" cy="0"/>
+        </a:xfrm>
+      </p:grpSpPr>
+      <p:sp>
+        <p:nvSpPr>
+          <p:cNvPr id="2" name="Title 1"/>
+          <p:cNvSpPr>
+            <a:spLocks noGrp="1"/>
+          </p:cNvSpPr>
+          <p:nvPr>
+            <p:ph type="title"/>
+          </p:nvPr>
+        </p:nvSpPr>
+        <p:spPr>
+          <a:xfrm>
+            <a:off x="321623" y="418905"/>
+            <a:ext cx="796693" cy="307777"/>
+          </a:xfrm>
+        </p:spPr>
+        <p:txBody>
+          <a:bodyPr/>
+          <a:lstStyle/>
+          <a:p>
+            <a:r>
+              <a:rPr lang="nb-NO" dirty="0" smtClean="0"/>
+              <a:t>ORM</a:t>
+            </a:r>
+            <a:endParaRPr lang="en-US" dirty="0"/>
+          </a:p>
+        </p:txBody>
+      </p:sp>
+      <p:sp>
+        <p:nvSpPr>
+          <p:cNvPr id="3" name="Slide Number Placeholder 2"/>
+          <p:cNvSpPr>
+            <a:spLocks noGrp="1"/>
+          </p:cNvSpPr>
+          <p:nvPr>
+            <p:ph type="sldNum" sz="quarter" idx="10"/>
+          </p:nvPr>
+        </p:nvSpPr>
+        <p:spPr/>
+        <p:txBody>
+          <a:bodyPr/>
+          <a:lstStyle/>
+          <a:p>
+            <a:fld id="{FF67BF5B-7344-D747-A0C2-CBD7B2ACBC85}" type="slidenum">
+              <a:rPr lang="en-US" smtClean="0"/>
+              <a:pPr/>
+              <a:t>9</a:t>
+            </a:fld>
+            <a:endParaRPr lang="en-US" dirty="0"/>
+          </a:p>
+        </p:txBody>
+      </p:sp>
+    </p:spTree>
+  </p:cSld>
+  <p:clrMapOvr>
+    <a:masterClrMapping/>
+  </p:clrMapOvr>
+  <p:transition>
+    <p:fade thruBlk="1"/>
+  </p:transition>
 </p:sld>
 </file>
 

</xml_diff>

<commit_message>
Made changes to slidedeck for persistingData
</commit_message>
<xml_diff>
--- a/persistingData/persistingData.pptx
+++ b/persistingData/persistingData.pptx
@@ -17144,13 +17144,6 @@
               </a:rPr>
               <a:t>	</a:t>
             </a:r>
-            <a:endParaRPr lang="en-US" sz="1050" dirty="0" smtClean="0">
-              <a:solidFill>
-                <a:srgbClr val="000000"/>
-              </a:solidFill>
-              <a:latin typeface="Consolas" pitchFamily="49" charset="0"/>
-              <a:cs typeface="Consolas" pitchFamily="49" charset="0"/>
-            </a:endParaRPr>
           </a:p>
           <a:p>
             <a:pPr marL="0" marR="0" lvl="0" indent="0" algn="l" defTabSz="914400" rtl="0" eaLnBrk="1" fontAlgn="base" latinLnBrk="0" hangingPunct="1">
@@ -17363,17 +17356,7 @@
                 <a:latin typeface="Consolas" pitchFamily="49" charset="0"/>
                 <a:cs typeface="Consolas" pitchFamily="49" charset="0"/>
               </a:rPr>
-              <a:t>	</a:t>
-            </a:r>
-            <a:r>
-              <a:rPr lang="en-US" sz="1050" dirty="0" smtClean="0">
-                <a:solidFill>
-                  <a:srgbClr val="000000"/>
-                </a:solidFill>
-                <a:latin typeface="Consolas" pitchFamily="49" charset="0"/>
-                <a:cs typeface="Consolas" pitchFamily="49" charset="0"/>
-              </a:rPr>
-              <a:t>	</a:t>
+              <a:t>		</a:t>
             </a:r>
             <a:r>
               <a:rPr kumimoji="0" lang="en-US" sz="1050" b="0" i="0" u="none" strike="noStrike" cap="none" normalizeH="0" baseline="0" dirty="0" smtClean="0">
@@ -17485,17 +17468,7 @@
                 <a:latin typeface="Consolas" pitchFamily="49" charset="0"/>
                 <a:cs typeface="Consolas" pitchFamily="49" charset="0"/>
               </a:rPr>
-              <a:t>	</a:t>
-            </a:r>
-            <a:r>
-              <a:rPr lang="en-US" sz="1050" dirty="0" smtClean="0">
-                <a:solidFill>
-                  <a:srgbClr val="000000"/>
-                </a:solidFill>
-                <a:latin typeface="Consolas" pitchFamily="49" charset="0"/>
-                <a:cs typeface="Consolas" pitchFamily="49" charset="0"/>
-              </a:rPr>
-              <a:t>	</a:t>
+              <a:t>		</a:t>
             </a:r>
             <a:r>
               <a:rPr kumimoji="0" lang="en-US" sz="1050" b="0" i="0" u="none" strike="noStrike" cap="none" normalizeH="0" baseline="0" dirty="0" smtClean="0">
@@ -17537,17 +17510,7 @@
                 <a:latin typeface="Consolas" pitchFamily="49" charset="0"/>
                 <a:cs typeface="Consolas" pitchFamily="49" charset="0"/>
               </a:rPr>
-              <a:t>	</a:t>
-            </a:r>
-            <a:r>
-              <a:rPr lang="en-US" sz="1050" dirty="0" smtClean="0">
-                <a:solidFill>
-                  <a:srgbClr val="000000"/>
-                </a:solidFill>
-                <a:latin typeface="Consolas" pitchFamily="49" charset="0"/>
-                <a:cs typeface="Consolas" pitchFamily="49" charset="0"/>
-              </a:rPr>
-              <a:t>		</a:t>
+              <a:t>			</a:t>
             </a:r>
             <a:r>
               <a:rPr kumimoji="0" lang="en-US" sz="1050" b="0" i="0" u="none" strike="noStrike" cap="none" normalizeH="0" baseline="0" dirty="0" err="1" smtClean="0">
@@ -17659,17 +17622,7 @@
                 <a:latin typeface="Consolas" pitchFamily="49" charset="0"/>
                 <a:cs typeface="Consolas" pitchFamily="49" charset="0"/>
               </a:rPr>
-              <a:t>	</a:t>
-            </a:r>
-            <a:r>
-              <a:rPr lang="en-US" sz="1050" dirty="0" smtClean="0">
-                <a:solidFill>
-                  <a:srgbClr val="000000"/>
-                </a:solidFill>
-                <a:latin typeface="Consolas" pitchFamily="49" charset="0"/>
-                <a:cs typeface="Consolas" pitchFamily="49" charset="0"/>
-              </a:rPr>
-              <a:t>		</a:t>
+              <a:t>			</a:t>
             </a:r>
             <a:r>
               <a:rPr kumimoji="0" lang="en-US" sz="1050" b="0" i="0" u="none" strike="noStrike" cap="none" normalizeH="0" baseline="0" dirty="0" err="1" smtClean="0">
@@ -17725,17 +17678,7 @@
                 <a:latin typeface="Consolas" pitchFamily="49" charset="0"/>
                 <a:cs typeface="Consolas" pitchFamily="49" charset="0"/>
               </a:rPr>
-              <a:t>	</a:t>
-            </a:r>
-            <a:r>
-              <a:rPr lang="en-US" sz="1050" dirty="0" smtClean="0">
-                <a:solidFill>
-                  <a:srgbClr val="000000"/>
-                </a:solidFill>
-                <a:latin typeface="Consolas" pitchFamily="49" charset="0"/>
-                <a:cs typeface="Consolas" pitchFamily="49" charset="0"/>
-              </a:rPr>
-              <a:t>		</a:t>
+              <a:t>			</a:t>
             </a:r>
             <a:r>
               <a:rPr kumimoji="0" lang="en-US" sz="1050" b="0" i="0" u="none" strike="noStrike" cap="none" normalizeH="0" baseline="0" dirty="0" err="1" smtClean="0">
@@ -17847,17 +17790,7 @@
                 <a:latin typeface="Consolas" pitchFamily="49" charset="0"/>
                 <a:cs typeface="Consolas" pitchFamily="49" charset="0"/>
               </a:rPr>
-              <a:t>	</a:t>
-            </a:r>
-            <a:r>
-              <a:rPr lang="en-US" sz="1050" dirty="0" smtClean="0">
-                <a:solidFill>
-                  <a:srgbClr val="000000"/>
-                </a:solidFill>
-                <a:latin typeface="Consolas" pitchFamily="49" charset="0"/>
-                <a:cs typeface="Consolas" pitchFamily="49" charset="0"/>
-              </a:rPr>
-              <a:t>		</a:t>
+              <a:t>			</a:t>
             </a:r>
             <a:r>
               <a:rPr kumimoji="0" lang="en-US" sz="1050" b="0" i="0" u="none" strike="noStrike" cap="none" normalizeH="0" baseline="0" dirty="0" smtClean="0">
@@ -17955,17 +17888,7 @@
                 <a:latin typeface="Consolas" pitchFamily="49" charset="0"/>
                 <a:cs typeface="Consolas" pitchFamily="49" charset="0"/>
               </a:rPr>
-              <a:t>	</a:t>
-            </a:r>
-            <a:r>
-              <a:rPr lang="en-US" sz="1050" dirty="0" smtClean="0">
-                <a:solidFill>
-                  <a:srgbClr val="000000"/>
-                </a:solidFill>
-                <a:latin typeface="Consolas" pitchFamily="49" charset="0"/>
-                <a:cs typeface="Consolas" pitchFamily="49" charset="0"/>
-              </a:rPr>
-              <a:t>	</a:t>
+              <a:t>		</a:t>
             </a:r>
             <a:r>
               <a:rPr kumimoji="0" lang="en-US" sz="1050" b="0" i="0" u="none" strike="noStrike" cap="none" normalizeH="0" baseline="0" dirty="0" smtClean="0">
@@ -18007,17 +17930,7 @@
                 <a:latin typeface="Consolas" pitchFamily="49" charset="0"/>
                 <a:cs typeface="Consolas" pitchFamily="49" charset="0"/>
               </a:rPr>
-              <a:t>	</a:t>
-            </a:r>
-            <a:r>
-              <a:rPr lang="en-US" sz="1050" dirty="0" smtClean="0">
-                <a:solidFill>
-                  <a:srgbClr val="000000"/>
-                </a:solidFill>
-                <a:latin typeface="Consolas" pitchFamily="49" charset="0"/>
-                <a:cs typeface="Consolas" pitchFamily="49" charset="0"/>
-              </a:rPr>
-              <a:t>	</a:t>
+              <a:t>		</a:t>
             </a:r>
             <a:r>
               <a:rPr kumimoji="0" lang="en-US" sz="1050" b="0" i="0" u="none" strike="noStrike" cap="none" normalizeH="0" baseline="0" dirty="0" smtClean="0">
@@ -18354,17 +18267,7 @@
                 <a:latin typeface="Consolas" pitchFamily="49" charset="0"/>
                 <a:cs typeface="Consolas" pitchFamily="49" charset="0"/>
               </a:rPr>
-              <a:t>	</a:t>
-            </a:r>
-            <a:r>
-              <a:rPr lang="en-US" sz="1050" dirty="0" smtClean="0">
-                <a:solidFill>
-                  <a:srgbClr val="000000"/>
-                </a:solidFill>
-                <a:latin typeface="Consolas" pitchFamily="49" charset="0"/>
-                <a:cs typeface="Consolas" pitchFamily="49" charset="0"/>
-              </a:rPr>
-              <a:t>	</a:t>
+              <a:t>		</a:t>
             </a:r>
             <a:r>
               <a:rPr kumimoji="0" lang="en-US" sz="1050" b="0" i="0" u="none" strike="noStrike" cap="none" normalizeH="0" baseline="0" dirty="0" smtClean="0">
@@ -18807,21 +18710,8 @@
                   <a:schemeClr val="bg1"/>
                 </a:solidFill>
               </a:rPr>
-              <a:t>Implementèr følgende repository for </a:t>
-            </a:r>
-            <a:r>
-              <a:rPr lang="nb-NO" dirty="0" smtClean="0">
-                <a:solidFill>
-                  <a:schemeClr val="bg1"/>
-                </a:solidFill>
-              </a:rPr>
-              <a:t>Person ved hjelp av NHibernate.</a:t>
-            </a:r>
-            <a:endParaRPr lang="nb-NO" dirty="0" smtClean="0">
-              <a:solidFill>
-                <a:schemeClr val="bg1"/>
-              </a:solidFill>
-            </a:endParaRPr>
+              <a:t>Implementèr følgende repository for Person ved hjelp av NHibernate.</a:t>
+            </a:r>
           </a:p>
           <a:p>
             <a:pPr marL="342900" indent="-342900" algn="just"/>
@@ -19844,11 +19734,7 @@
             </a:pPr>
             <a:r>
               <a:rPr lang="nb-NO" sz="1400" dirty="0" smtClean="0"/>
-              <a:t> </a:t>
-            </a:r>
-            <a:r>
-              <a:rPr lang="nb-NO" sz="1400" dirty="0" smtClean="0"/>
-              <a:t>ADO.NET</a:t>
+              <a:t> ADO.NET</a:t>
             </a:r>
           </a:p>
           <a:p>
@@ -19882,7 +19768,6 @@
               <a:rPr lang="nb-NO" sz="1400" dirty="0" smtClean="0"/>
               <a:t>NHibernate</a:t>
             </a:r>
-            <a:endParaRPr lang="nb-NO" sz="1400" dirty="0" smtClean="0"/>
           </a:p>
           <a:p>
             <a:pPr>
@@ -19913,13 +19798,8 @@
             </a:pPr>
             <a:r>
               <a:rPr lang="nb-NO" sz="1400" dirty="0" smtClean="0"/>
-              <a:t> </a:t>
-            </a:r>
-            <a:r>
-              <a:rPr lang="nb-NO" sz="1400" dirty="0" smtClean="0"/>
-              <a:t>Dapper</a:t>
-            </a:r>
-            <a:endParaRPr lang="nb-NO" sz="1400" dirty="0" smtClean="0"/>
+              <a:t> Dapper</a:t>
+            </a:r>
           </a:p>
         </p:txBody>
       </p:sp>

</xml_diff>

<commit_message>
More details on NHibernate added to slidedeck
</commit_message>
<xml_diff>
--- a/persistingData/persistingData.pptx
+++ b/persistingData/persistingData.pptx
@@ -13059,7 +13059,7 @@
         </p:nvSpPr>
         <p:spPr bwMode="auto">
           <a:xfrm>
-            <a:off x="4717279" y="2274596"/>
+            <a:off x="4717279" y="2410523"/>
             <a:ext cx="3707171" cy="769441"/>
           </a:xfrm>
           <a:prstGeom prst="rect">
@@ -13392,7 +13392,7 @@
             </a:pPr>
             <a:r>
               <a:rPr lang="nb-NO" sz="1400" i="1" dirty="0" smtClean="0"/>
-              <a:t>get is as late as possible and get rid of it as soon as you can</a:t>
+              <a:t>get it as late as possible and get rid of it as soon as you can</a:t>
             </a:r>
             <a:endParaRPr lang="nb-NO" sz="1400" i="1" dirty="0" smtClean="0"/>
           </a:p>
@@ -13677,8 +13677,13 @@
             </a:pPr>
             <a:r>
               <a:rPr lang="nb-NO" sz="1400" dirty="0" smtClean="0"/>
-              <a:t> Open-source ORM</a:t>
-            </a:r>
+              <a:t> Open-source </a:t>
+            </a:r>
+            <a:r>
+              <a:rPr lang="nb-NO" sz="1400" dirty="0" smtClean="0"/>
+              <a:t>ORM for .NET rammeverket</a:t>
+            </a:r>
+            <a:endParaRPr lang="nb-NO" sz="1400" dirty="0" smtClean="0"/>
           </a:p>
           <a:p>
             <a:pPr>
@@ -13769,6 +13774,58 @@
           </a:p>
         </p:txBody>
       </p:sp>
+      <p:pic>
+        <p:nvPicPr>
+          <p:cNvPr id="22530" name="Picture 2" descr="http://nhforge.org/doc/nh/shared/images/lite.png"/>
+          <p:cNvPicPr>
+            <a:picLocks noChangeAspect="1" noChangeArrowheads="1"/>
+          </p:cNvPicPr>
+          <p:nvPr/>
+        </p:nvPicPr>
+        <p:blipFill>
+          <a:blip r:embed="rId3"/>
+          <a:srcRect/>
+          <a:stretch>
+            <a:fillRect/>
+          </a:stretch>
+        </p:blipFill>
+        <p:spPr bwMode="auto">
+          <a:xfrm>
+            <a:off x="5527675" y="4022385"/>
+            <a:ext cx="3419475" cy="2514600"/>
+          </a:xfrm>
+          <a:prstGeom prst="rect">
+            <a:avLst/>
+          </a:prstGeom>
+          <a:noFill/>
+        </p:spPr>
+      </p:pic>
+      <p:pic>
+        <p:nvPicPr>
+          <p:cNvPr id="22532" name="Picture 4" descr="http://nhforge.org/doc/nh/shared/images/fullcream.png"/>
+          <p:cNvPicPr>
+            <a:picLocks noChangeAspect="1" noChangeArrowheads="1"/>
+          </p:cNvPicPr>
+          <p:nvPr/>
+        </p:nvPicPr>
+        <p:blipFill>
+          <a:blip r:embed="rId4"/>
+          <a:srcRect/>
+          <a:stretch>
+            <a:fillRect/>
+          </a:stretch>
+        </p:blipFill>
+        <p:spPr bwMode="auto">
+          <a:xfrm>
+            <a:off x="155575" y="3098459"/>
+            <a:ext cx="4791075" cy="3438526"/>
+          </a:xfrm>
+          <a:prstGeom prst="rect">
+            <a:avLst/>
+          </a:prstGeom>
+          <a:noFill/>
+        </p:spPr>
+      </p:pic>
     </p:spTree>
   </p:cSld>
   <p:clrMapOvr>
@@ -13946,8 +14003,8 @@
         </p:nvSpPr>
         <p:spPr bwMode="auto">
           <a:xfrm>
-            <a:off x="612250" y="1740523"/>
-            <a:ext cx="7812200" cy="784830"/>
+            <a:off x="612250" y="1671273"/>
+            <a:ext cx="7812200" cy="923330"/>
           </a:xfrm>
           <a:prstGeom prst="rect">
             <a:avLst/>
@@ -14104,7 +14161,156 @@
                 <a:latin typeface="Consolas" pitchFamily="49" charset="0"/>
                 <a:cs typeface="Consolas" pitchFamily="49" charset="0"/>
               </a:rPr>
-              <a:t>{                 </a:t>
+              <a:t>{             </a:t>
+            </a:r>
+            <a:endParaRPr kumimoji="0" lang="en-US" sz="900" b="0" i="0" u="none" strike="noStrike" cap="none" normalizeH="0" baseline="0" dirty="0" smtClean="0">
+              <a:ln>
+                <a:noFill/>
+              </a:ln>
+              <a:solidFill>
+                <a:srgbClr val="000000"/>
+              </a:solidFill>
+              <a:effectLst/>
+              <a:latin typeface="Consolas" pitchFamily="49" charset="0"/>
+              <a:cs typeface="Consolas" pitchFamily="49" charset="0"/>
+            </a:endParaRPr>
+          </a:p>
+          <a:p>
+            <a:pPr defTabSz="914400" fontAlgn="base">
+              <a:spcBef>
+                <a:spcPct val="0"/>
+              </a:spcBef>
+              <a:spcAft>
+                <a:spcPct val="0"/>
+              </a:spcAft>
+            </a:pPr>
+            <a:r>
+              <a:rPr lang="en-US" sz="900" dirty="0" smtClean="0">
+                <a:solidFill>
+                  <a:srgbClr val="0000FF"/>
+                </a:solidFill>
+                <a:latin typeface="Consolas" pitchFamily="49" charset="0"/>
+                <a:cs typeface="Consolas" pitchFamily="49" charset="0"/>
+              </a:rPr>
+              <a:t>	public </a:t>
+            </a:r>
+            <a:r>
+              <a:rPr lang="en-US" sz="900" dirty="0" smtClean="0">
+                <a:solidFill>
+                  <a:srgbClr val="0000FF"/>
+                </a:solidFill>
+                <a:latin typeface="Consolas" pitchFamily="49" charset="0"/>
+                <a:cs typeface="Consolas" pitchFamily="49" charset="0"/>
+              </a:rPr>
+              <a:t>virtual</a:t>
+            </a:r>
+            <a:r>
+              <a:rPr lang="en-US" sz="900" dirty="0" smtClean="0">
+                <a:solidFill>
+                  <a:srgbClr val="000000"/>
+                </a:solidFill>
+                <a:latin typeface="Consolas" pitchFamily="49" charset="0"/>
+                <a:cs typeface="Consolas" pitchFamily="49" charset="0"/>
+              </a:rPr>
+              <a:t> </a:t>
+            </a:r>
+            <a:r>
+              <a:rPr lang="en-US" sz="900" dirty="0" err="1" smtClean="0">
+                <a:solidFill>
+                  <a:srgbClr val="2B91AF"/>
+                </a:solidFill>
+                <a:latin typeface="Consolas" pitchFamily="49" charset="0"/>
+                <a:cs typeface="Consolas" pitchFamily="49" charset="0"/>
+              </a:rPr>
+              <a:t>Guid</a:t>
+            </a:r>
+            <a:r>
+              <a:rPr lang="en-US" sz="900" dirty="0" smtClean="0"/>
+              <a:t> </a:t>
+            </a:r>
+            <a:r>
+              <a:rPr lang="en-US" sz="900" dirty="0" smtClean="0">
+                <a:solidFill>
+                  <a:srgbClr val="000000"/>
+                </a:solidFill>
+                <a:latin typeface="Consolas" pitchFamily="49" charset="0"/>
+                <a:cs typeface="Consolas" pitchFamily="49" charset="0"/>
+              </a:rPr>
+              <a:t> </a:t>
+            </a:r>
+            <a:r>
+              <a:rPr lang="en-US" sz="900" dirty="0" smtClean="0">
+                <a:solidFill>
+                  <a:srgbClr val="000000"/>
+                </a:solidFill>
+                <a:latin typeface="Consolas" pitchFamily="49" charset="0"/>
+                <a:cs typeface="Consolas" pitchFamily="49" charset="0"/>
+              </a:rPr>
+              <a:t>Id</a:t>
+            </a:r>
+            <a:r>
+              <a:rPr lang="en-US" sz="900" dirty="0" smtClean="0">
+                <a:solidFill>
+                  <a:srgbClr val="000000"/>
+                </a:solidFill>
+                <a:latin typeface="Consolas" pitchFamily="49" charset="0"/>
+                <a:cs typeface="Consolas" pitchFamily="49" charset="0"/>
+              </a:rPr>
+              <a:t> { </a:t>
+            </a:r>
+            <a:r>
+              <a:rPr lang="en-US" sz="900" dirty="0" smtClean="0">
+                <a:solidFill>
+                  <a:srgbClr val="0000FF"/>
+                </a:solidFill>
+                <a:latin typeface="Consolas" pitchFamily="49" charset="0"/>
+                <a:cs typeface="Consolas" pitchFamily="49" charset="0"/>
+              </a:rPr>
+              <a:t>get</a:t>
+            </a:r>
+            <a:r>
+              <a:rPr lang="en-US" sz="900" dirty="0" smtClean="0">
+                <a:solidFill>
+                  <a:srgbClr val="000000"/>
+                </a:solidFill>
+                <a:latin typeface="Consolas" pitchFamily="49" charset="0"/>
+                <a:cs typeface="Consolas" pitchFamily="49" charset="0"/>
+              </a:rPr>
+              <a:t>; </a:t>
+            </a:r>
+            <a:r>
+              <a:rPr lang="en-US" sz="900" dirty="0" smtClean="0">
+                <a:solidFill>
+                  <a:srgbClr val="0000FF"/>
+                </a:solidFill>
+                <a:latin typeface="Consolas" pitchFamily="49" charset="0"/>
+                <a:cs typeface="Consolas" pitchFamily="49" charset="0"/>
+              </a:rPr>
+              <a:t>set</a:t>
+            </a:r>
+            <a:r>
+              <a:rPr lang="en-US" sz="900" dirty="0" smtClean="0">
+                <a:solidFill>
+                  <a:srgbClr val="000000"/>
+                </a:solidFill>
+                <a:latin typeface="Consolas" pitchFamily="49" charset="0"/>
+                <a:cs typeface="Consolas" pitchFamily="49" charset="0"/>
+              </a:rPr>
+              <a:t>; }         </a:t>
+            </a:r>
+            <a:r>
+              <a:rPr kumimoji="0" lang="en-US" sz="900" b="0" i="0" u="none" strike="noStrike" cap="none" normalizeH="0" baseline="0" dirty="0" smtClean="0">
+                <a:ln>
+                  <a:noFill/>
+                </a:ln>
+                <a:solidFill>
+                  <a:srgbClr val="000000"/>
+                </a:solidFill>
+                <a:effectLst/>
+                <a:latin typeface="Consolas" pitchFamily="49" charset="0"/>
+                <a:cs typeface="Consolas" pitchFamily="49" charset="0"/>
+              </a:rPr>
+              <a:t>    </a:t>
             </a:r>
           </a:p>
           <a:p>
@@ -14483,7 +14689,7 @@
         <p:spPr>
           <a:xfrm>
             <a:off x="370660" y="2910736"/>
-            <a:ext cx="8102827" cy="651460"/>
+            <a:ext cx="8102827" cy="3272691"/>
           </a:xfrm>
           <a:prstGeom prst="rect">
             <a:avLst/>
@@ -14506,8 +14712,109 @@
             </a:pPr>
             <a:r>
               <a:rPr lang="nb-NO" sz="1400" dirty="0" smtClean="0"/>
-              <a:t>2. Definere mappingen (&lt;className&gt;.hbm.xml)</a:t>
-            </a:r>
+              <a:t>2. Definere mappingen (&lt;className&gt;.hbm.xml</a:t>
+            </a:r>
+            <a:r>
+              <a:rPr lang="nb-NO" sz="1400" dirty="0" smtClean="0"/>
+              <a:t>)</a:t>
+            </a:r>
+            <a:br>
+              <a:rPr lang="nb-NO" sz="1400" dirty="0" smtClean="0"/>
+            </a:br>
+            <a:endParaRPr lang="nb-NO" sz="1400" dirty="0" smtClean="0"/>
+          </a:p>
+          <a:p>
+            <a:pPr>
+              <a:spcBef>
+                <a:spcPts val="600"/>
+              </a:spcBef>
+              <a:spcAft>
+                <a:spcPts val="400"/>
+              </a:spcAft>
+            </a:pPr>
+            <a:endParaRPr lang="nb-NO" sz="1400" dirty="0" smtClean="0"/>
+          </a:p>
+          <a:p>
+            <a:pPr>
+              <a:spcBef>
+                <a:spcPts val="600"/>
+              </a:spcBef>
+              <a:spcAft>
+                <a:spcPts val="400"/>
+              </a:spcAft>
+            </a:pPr>
+            <a:endParaRPr lang="nb-NO" sz="1400" dirty="0" smtClean="0"/>
+          </a:p>
+          <a:p>
+            <a:pPr>
+              <a:spcBef>
+                <a:spcPts val="600"/>
+              </a:spcBef>
+              <a:spcAft>
+                <a:spcPts val="400"/>
+              </a:spcAft>
+            </a:pPr>
+            <a:endParaRPr lang="nb-NO" sz="1400" dirty="0" smtClean="0"/>
+          </a:p>
+          <a:p>
+            <a:pPr>
+              <a:spcBef>
+                <a:spcPts val="600"/>
+              </a:spcBef>
+              <a:spcAft>
+                <a:spcPts val="400"/>
+              </a:spcAft>
+            </a:pPr>
+            <a:endParaRPr lang="nb-NO" sz="1400" dirty="0" smtClean="0"/>
+          </a:p>
+          <a:p>
+            <a:pPr>
+              <a:spcBef>
+                <a:spcPts val="600"/>
+              </a:spcBef>
+              <a:spcAft>
+                <a:spcPts val="400"/>
+              </a:spcAft>
+            </a:pPr>
+            <a:endParaRPr lang="nb-NO" sz="1400" dirty="0" smtClean="0"/>
+          </a:p>
+          <a:p>
+            <a:pPr>
+              <a:spcBef>
+                <a:spcPts val="600"/>
+              </a:spcBef>
+              <a:spcAft>
+                <a:spcPts val="400"/>
+              </a:spcAft>
+            </a:pPr>
+            <a:endParaRPr lang="nb-NO" sz="1400" dirty="0" smtClean="0"/>
+          </a:p>
+          <a:p>
+            <a:pPr>
+              <a:spcBef>
+                <a:spcPts val="600"/>
+              </a:spcBef>
+              <a:spcAft>
+                <a:spcPts val="400"/>
+              </a:spcAft>
+            </a:pPr>
+            <a:r>
+              <a:rPr lang="nb-NO" sz="1400" dirty="0" smtClean="0"/>
+              <a:t>Husk </a:t>
+            </a:r>
+            <a:r>
+              <a:rPr lang="nb-NO" sz="1400" i="1" dirty="0" smtClean="0"/>
+              <a:t>Build Action</a:t>
+            </a:r>
+            <a:r>
+              <a:rPr lang="nb-NO" sz="1400" dirty="0" smtClean="0"/>
+              <a:t> til </a:t>
+            </a:r>
+            <a:r>
+              <a:rPr lang="nb-NO" sz="1400" i="1" dirty="0" smtClean="0"/>
+              <a:t>Embedded Resource</a:t>
+            </a:r>
+            <a:endParaRPr lang="nb-NO" sz="1400" i="1" dirty="0" smtClean="0"/>
           </a:p>
           <a:p>
             <a:pPr>
@@ -18264,7 +18571,7 @@
         <p:spPr>
           <a:xfrm>
             <a:off x="338856" y="4444499"/>
-            <a:ext cx="8102827" cy="651460"/>
+            <a:ext cx="8102827" cy="2492990"/>
           </a:xfrm>
           <a:prstGeom prst="rect">
             <a:avLst/>
@@ -18287,8 +18594,90 @@
             </a:pPr>
             <a:r>
               <a:rPr lang="nb-NO" sz="1400" dirty="0" smtClean="0"/>
-              <a:t>5. Opprett en test som verifiserer at alt er satt opp riktig</a:t>
-            </a:r>
+              <a:t>5. Opprett en test som verifiserer at alt er satt opp </a:t>
+            </a:r>
+            <a:r>
+              <a:rPr lang="nb-NO" sz="1400" dirty="0" smtClean="0"/>
+              <a:t>riktig</a:t>
+            </a:r>
+          </a:p>
+          <a:p>
+            <a:pPr>
+              <a:spcBef>
+                <a:spcPts val="600"/>
+              </a:spcBef>
+              <a:spcAft>
+                <a:spcPts val="400"/>
+              </a:spcAft>
+            </a:pPr>
+            <a:endParaRPr lang="nb-NO" sz="1400" dirty="0" smtClean="0"/>
+          </a:p>
+          <a:p>
+            <a:pPr>
+              <a:spcBef>
+                <a:spcPts val="600"/>
+              </a:spcBef>
+              <a:spcAft>
+                <a:spcPts val="400"/>
+              </a:spcAft>
+            </a:pPr>
+            <a:endParaRPr lang="nb-NO" sz="1400" dirty="0" smtClean="0"/>
+          </a:p>
+          <a:p>
+            <a:pPr>
+              <a:spcBef>
+                <a:spcPts val="600"/>
+              </a:spcBef>
+              <a:spcAft>
+                <a:spcPts val="400"/>
+              </a:spcAft>
+            </a:pPr>
+            <a:endParaRPr lang="nb-NO" sz="1400" dirty="0" smtClean="0"/>
+          </a:p>
+          <a:p>
+            <a:pPr>
+              <a:spcBef>
+                <a:spcPts val="600"/>
+              </a:spcBef>
+              <a:spcAft>
+                <a:spcPts val="400"/>
+              </a:spcAft>
+            </a:pPr>
+            <a:endParaRPr lang="nb-NO" sz="1400" dirty="0" smtClean="0"/>
+          </a:p>
+          <a:p>
+            <a:pPr>
+              <a:spcBef>
+                <a:spcPts val="600"/>
+              </a:spcBef>
+              <a:spcAft>
+                <a:spcPts val="400"/>
+              </a:spcAft>
+            </a:pPr>
+            <a:r>
+              <a:rPr lang="nb-NO" sz="1100" dirty="0" smtClean="0"/>
+              <a:t/>
+            </a:r>
+            <a:br>
+              <a:rPr lang="nb-NO" sz="1100" dirty="0" smtClean="0"/>
+            </a:br>
+            <a:r>
+              <a:rPr lang="nb-NO" sz="1100" dirty="0" smtClean="0"/>
+              <a:t>Testprosjektet må ha referanse </a:t>
+            </a:r>
+            <a:r>
+              <a:rPr lang="nb-NO" sz="1100" dirty="0" smtClean="0"/>
+              <a:t>til NHibernate.dll, Iesi.Collections.dll, </a:t>
+            </a:r>
+            <a:r>
+              <a:rPr lang="nb-NO" sz="1100" dirty="0" smtClean="0"/>
+              <a:t>System.Data.SqlServerCe.dll </a:t>
+            </a:r>
+            <a:r>
+              <a:rPr lang="nb-NO" sz="1100" dirty="0" smtClean="0"/>
+              <a:t>i tillegg til selve prosjektet</a:t>
+            </a:r>
+            <a:endParaRPr lang="nb-NO" sz="1100" dirty="0" smtClean="0"/>
           </a:p>
           <a:p>
             <a:pPr>
@@ -22005,7 +22394,7 @@
         <p:spPr>
           <a:xfrm>
             <a:off x="321623" y="1397000"/>
-            <a:ext cx="8102827" cy="1682512"/>
+            <a:ext cx="8102827" cy="2026196"/>
           </a:xfrm>
           <a:prstGeom prst="rect">
             <a:avLst/>
@@ -22046,8 +22435,33 @@
             </a:pPr>
             <a:r>
               <a:rPr lang="nb-NO" sz="1400" dirty="0" smtClean="0"/>
-              <a:t>Object Relational Mapping</a:t>
-            </a:r>
+              <a:t>Object Relational </a:t>
+            </a:r>
+            <a:r>
+              <a:rPr lang="nb-NO" sz="1400" dirty="0" smtClean="0"/>
+              <a:t>Mapping</a:t>
+            </a:r>
+          </a:p>
+          <a:p>
+            <a:pPr lvl="1">
+              <a:spcBef>
+                <a:spcPts val="600"/>
+              </a:spcBef>
+              <a:spcAft>
+                <a:spcPts val="400"/>
+              </a:spcAft>
+              <a:buFont typeface="Wingdings" pitchFamily="2" charset="2"/>
+              <a:buChar char="ü"/>
+            </a:pPr>
+            <a:r>
+              <a:rPr lang="nb-NO" sz="1400" dirty="0" smtClean="0"/>
+              <a:t> </a:t>
+            </a:r>
+            <a:r>
+              <a:rPr lang="nb-NO" sz="1400" dirty="0" smtClean="0"/>
+              <a:t>LINQ To...</a:t>
+            </a:r>
+            <a:endParaRPr lang="nb-NO" sz="1400" dirty="0" smtClean="0"/>
           </a:p>
           <a:p>
             <a:pPr lvl="1">
@@ -22226,7 +22640,7 @@
         <p:spPr>
           <a:xfrm>
             <a:off x="321623" y="935335"/>
-            <a:ext cx="8102827" cy="3600986"/>
+            <a:ext cx="8102827" cy="4939814"/>
           </a:xfrm>
           <a:prstGeom prst="rect">
             <a:avLst/>
@@ -22559,8 +22973,63 @@
                   <a:schemeClr val="bg1"/>
                 </a:solidFill>
               </a:rPr>
-              <a:t>Prøv å gjennomføre denne oppgaven test-først</a:t>
-            </a:r>
+              <a:t>Prøv å gjennomføre denne oppgaven </a:t>
+            </a:r>
+            <a:r>
+              <a:rPr lang="nb-NO" dirty="0" smtClean="0">
+                <a:solidFill>
+                  <a:schemeClr val="bg1"/>
+                </a:solidFill>
+              </a:rPr>
+              <a:t>test-først</a:t>
+            </a:r>
+          </a:p>
+          <a:p>
+            <a:pPr marL="342900" indent="-342900" algn="just"/>
+            <a:endParaRPr lang="nb-NO" dirty="0" smtClean="0">
+              <a:solidFill>
+                <a:schemeClr val="bg1"/>
+              </a:solidFill>
+              <a:latin typeface="Consolas" pitchFamily="49" charset="0"/>
+              <a:cs typeface="Consolas" pitchFamily="49" charset="0"/>
+            </a:endParaRPr>
+          </a:p>
+          <a:p>
+            <a:pPr marL="342900" indent="-342900" algn="just"/>
+            <a:endParaRPr lang="nb-NO" dirty="0" smtClean="0">
+              <a:solidFill>
+                <a:schemeClr val="bg1"/>
+              </a:solidFill>
+              <a:latin typeface="Consolas" pitchFamily="49" charset="0"/>
+              <a:cs typeface="Consolas" pitchFamily="49" charset="0"/>
+            </a:endParaRPr>
+          </a:p>
+          <a:p>
+            <a:pPr marL="342900" indent="-342900"/>
+            <a:r>
+              <a:rPr lang="nb-NO" sz="1100" i="1" dirty="0" smtClean="0">
+                <a:solidFill>
+                  <a:schemeClr val="bg1"/>
+                </a:solidFill>
+              </a:rPr>
+              <a:t>Hint: </a:t>
+            </a:r>
+            <a:r>
+              <a:rPr lang="nb-NO" sz="1100" i="1" dirty="0" smtClean="0">
+                <a:solidFill>
+                  <a:schemeClr val="bg1"/>
+                </a:solidFill>
+              </a:rPr>
+              <a:t>For å kunne verifisere at noe er lagret i databasen, kan det være nødvendig å opprette en sessionFactory som kan brukes av testene for å gjøre spørringer mot databasen utenom repository. Denne bør kun initialiseres èn gang, en idè kan være å bruke [ClassInitialize] attributten for å få til dette innenfor en testklasse.</a:t>
+            </a:r>
+            <a:endParaRPr lang="nb-NO" sz="1100" i="1" dirty="0" smtClean="0">
+              <a:solidFill>
+                <a:schemeClr val="bg1"/>
+              </a:solidFill>
+            </a:endParaRPr>
+          </a:p>
+          <a:p>
+            <a:pPr marL="342900" indent="-342900" algn="just"/>
             <a:endParaRPr lang="nb-NO" dirty="0" smtClean="0">
               <a:solidFill>
                 <a:schemeClr val="bg1"/>
@@ -29771,7 +30240,15 @@
             </a:pPr>
             <a:r>
               <a:rPr lang="nb-NO" sz="1400" dirty="0" smtClean="0"/>
-              <a:t> Entity Framework</a:t>
+              <a:t> </a:t>
+            </a:r>
+            <a:r>
+              <a:rPr lang="nb-NO" sz="1400" dirty="0" smtClean="0"/>
+              <a:t>ADO.NET Entity </a:t>
+            </a:r>
+            <a:r>
+              <a:rPr lang="nb-NO" sz="1400" dirty="0" smtClean="0"/>
+              <a:t>Framework</a:t>
             </a:r>
           </a:p>
           <a:p>

</xml_diff>

<commit_message>
Corrected a couple of misspellings in slidedeck
</commit_message>
<xml_diff>
--- a/persistingData/persistingData.pptx
+++ b/persistingData/persistingData.pptx
@@ -159,7 +159,7 @@
     </p:spTree>
     <p:extLst>
       <p:ext uri="{BB962C8B-B14F-4D97-AF65-F5344CB8AC3E}">
-        <p14:creationId xmlns="" xmlns:p14="http://schemas.microsoft.com/office/powerpoint/2010/main" val="2280443481"/>
+        <p14:creationId xmlns:p14="http://schemas.microsoft.com/office/powerpoint/2010/main" xmlns="" val="2280443481"/>
       </p:ext>
     </p:extLst>
   </p:cSld>
@@ -329,7 +329,7 @@
     </p:spTree>
     <p:extLst>
       <p:ext uri="{BB962C8B-B14F-4D97-AF65-F5344CB8AC3E}">
-        <p14:creationId xmlns="" xmlns:p14="http://schemas.microsoft.com/office/powerpoint/2010/main" val="1996866432"/>
+        <p14:creationId xmlns:p14="http://schemas.microsoft.com/office/powerpoint/2010/main" xmlns="" val="1996866432"/>
       </p:ext>
     </p:extLst>
   </p:cSld>
@@ -564,8 +564,38 @@
             </a:r>
             <a:r>
               <a:rPr lang="nb-NO" baseline="0" dirty="0" smtClean="0"/>
-              <a:t> inneholder en in-memory representasjon av relasjonsdatabasen inkludert alle tabeller og relasjoner</a:t>
-            </a:r>
+              <a:t> inneholder en in-memory representasjon av relasjonsdatabasen inkludert alle tabeller og </a:t>
+            </a:r>
+            <a:r>
+              <a:rPr lang="nb-NO" baseline="0" dirty="0" smtClean="0"/>
+              <a:t>relasjoner</a:t>
+            </a:r>
+          </a:p>
+          <a:p>
+            <a:pPr>
+              <a:buFontTx/>
+              <a:buChar char="-"/>
+            </a:pPr>
+            <a:r>
+              <a:rPr lang="nb-NO" baseline="0" dirty="0" smtClean="0"/>
+              <a:t> Data-drevet applikasjon i stedet for objektorientert applikasjon</a:t>
+            </a:r>
+          </a:p>
+          <a:p>
+            <a:pPr>
+              <a:buFontTx/>
+              <a:buChar char="-"/>
+            </a:pPr>
+            <a:r>
+              <a:rPr lang="nb-NO" baseline="0" dirty="0" smtClean="0"/>
+              <a:t> lite testbart</a:t>
+            </a:r>
+          </a:p>
+          <a:p>
+            <a:pPr>
+              <a:buFontTx/>
+              <a:buChar char="-"/>
+            </a:pPr>
             <a:endParaRPr lang="en-US" dirty="0"/>
           </a:p>
         </p:txBody>
@@ -706,7 +736,59 @@
             </a:r>
             <a:r>
               <a:rPr lang="nb-NO" baseline="0" dirty="0" smtClean="0"/>
-              <a:t> i valgt programmeringsspråk (f.eks C#)</a:t>
+              <a:t> i valgt programmeringsspråk (f.eks C</a:t>
+            </a:r>
+            <a:r>
+              <a:rPr lang="nb-NO" baseline="0" dirty="0" smtClean="0"/>
+              <a:t>#)</a:t>
+            </a:r>
+          </a:p>
+          <a:p>
+            <a:endParaRPr lang="nb-NO" baseline="0" dirty="0" smtClean="0"/>
+          </a:p>
+          <a:p>
+            <a:pPr marL="342900" indent="-342900">
+              <a:buAutoNum type="arabicPeriod"/>
+            </a:pPr>
+            <a:r>
+              <a:rPr lang="nb-NO" baseline="0" dirty="0" smtClean="0"/>
+              <a:t>Lazy loading, laste opp deler av en stor struktur</a:t>
+            </a:r>
+          </a:p>
+          <a:p>
+            <a:pPr marL="342900" indent="-342900">
+              <a:buAutoNum type="arabicPeriod"/>
+            </a:pPr>
+            <a:r>
+              <a:rPr lang="nb-NO" baseline="0" dirty="0" smtClean="0"/>
+              <a:t>Identity Map – dictionary med oversikt over hvilke objekter som allerede er hentet ut i minne i nåværende kontekst</a:t>
+            </a:r>
+          </a:p>
+          <a:p>
+            <a:pPr marL="342900" indent="-342900">
+              <a:buAutoNum type="arabicPeriod"/>
+            </a:pPr>
+            <a:r>
+              <a:rPr lang="nb-NO" baseline="0" dirty="0" smtClean="0"/>
+              <a:t>Unit Of Work – ORM må til en hver tid vite hva som er endret og hvorfor (lagt til, endret, slettet)</a:t>
+            </a:r>
+          </a:p>
+          <a:p>
+            <a:pPr marL="342900" indent="-342900">
+              <a:buAutoNum type="arabicPeriod"/>
+            </a:pPr>
+            <a:r>
+              <a:rPr lang="nb-NO" baseline="0" dirty="0" smtClean="0"/>
+              <a:t>Optimistic offline lock – anta at ikke data blir endret, men gi feilmelding hvis man ser at data er endret</a:t>
+            </a:r>
+          </a:p>
+          <a:p>
+            <a:pPr marL="342900" indent="-342900">
+              <a:buAutoNum type="arabicPeriod"/>
+            </a:pPr>
+            <a:r>
+              <a:rPr lang="nb-NO" baseline="0" dirty="0" smtClean="0"/>
+              <a:t>Data mapper – mapping mellom objekter i c# POCO og tabeller</a:t>
             </a:r>
             <a:endParaRPr lang="en-US" dirty="0"/>
           </a:p>
@@ -1477,7 +1559,7 @@
     </p:spTree>
     <p:extLst>
       <p:ext uri="{BB962C8B-B14F-4D97-AF65-F5344CB8AC3E}">
-        <p14:creationId xmlns="" xmlns:p14="http://schemas.microsoft.com/office/powerpoint/2010/main" val="1631701370"/>
+        <p14:creationId xmlns:p14="http://schemas.microsoft.com/office/powerpoint/2010/main" xmlns="" val="1631701370"/>
       </p:ext>
     </p:extLst>
   </p:cSld>
@@ -1798,7 +1880,7 @@
     </p:spTree>
     <p:extLst>
       <p:ext uri="{BB962C8B-B14F-4D97-AF65-F5344CB8AC3E}">
-        <p14:creationId xmlns="" xmlns:p14="http://schemas.microsoft.com/office/powerpoint/2010/main" val="2627694574"/>
+        <p14:creationId xmlns:p14="http://schemas.microsoft.com/office/powerpoint/2010/main" xmlns="" val="2627694574"/>
       </p:ext>
     </p:extLst>
   </p:cSld>
@@ -2117,7 +2199,7 @@
     </p:spTree>
     <p:extLst>
       <p:ext uri="{BB962C8B-B14F-4D97-AF65-F5344CB8AC3E}">
-        <p14:creationId xmlns="" xmlns:p14="http://schemas.microsoft.com/office/powerpoint/2010/main" val="2472564093"/>
+        <p14:creationId xmlns:p14="http://schemas.microsoft.com/office/powerpoint/2010/main" xmlns="" val="2472564093"/>
       </p:ext>
     </p:extLst>
   </p:cSld>
@@ -2602,7 +2684,7 @@
     </p:spTree>
     <p:extLst>
       <p:ext uri="{BB962C8B-B14F-4D97-AF65-F5344CB8AC3E}">
-        <p14:creationId xmlns="" xmlns:p14="http://schemas.microsoft.com/office/powerpoint/2010/main" val="844442129"/>
+        <p14:creationId xmlns:p14="http://schemas.microsoft.com/office/powerpoint/2010/main" xmlns="" val="844442129"/>
       </p:ext>
     </p:extLst>
   </p:cSld>
@@ -2932,7 +3014,7 @@
     </p:spTree>
     <p:extLst>
       <p:ext uri="{BB962C8B-B14F-4D97-AF65-F5344CB8AC3E}">
-        <p14:creationId xmlns="" xmlns:p14="http://schemas.microsoft.com/office/powerpoint/2010/main" val="1607786633"/>
+        <p14:creationId xmlns:p14="http://schemas.microsoft.com/office/powerpoint/2010/main" xmlns="" val="1607786633"/>
       </p:ext>
     </p:extLst>
   </p:cSld>
@@ -3262,7 +3344,7 @@
     </p:spTree>
     <p:extLst>
       <p:ext uri="{BB962C8B-B14F-4D97-AF65-F5344CB8AC3E}">
-        <p14:creationId xmlns="" xmlns:p14="http://schemas.microsoft.com/office/powerpoint/2010/main" val="3400319444"/>
+        <p14:creationId xmlns:p14="http://schemas.microsoft.com/office/powerpoint/2010/main" xmlns="" val="3400319444"/>
       </p:ext>
     </p:extLst>
   </p:cSld>
@@ -5132,7 +5214,7 @@
     </p:spTree>
     <p:extLst>
       <p:ext uri="{BB962C8B-B14F-4D97-AF65-F5344CB8AC3E}">
-        <p14:creationId xmlns="" xmlns:p14="http://schemas.microsoft.com/office/powerpoint/2010/main" val="1273682958"/>
+        <p14:creationId xmlns:p14="http://schemas.microsoft.com/office/powerpoint/2010/main" xmlns="" val="1273682958"/>
       </p:ext>
     </p:extLst>
   </p:cSld>
@@ -5237,7 +5319,7 @@
     </p:spTree>
     <p:extLst>
       <p:ext uri="{BB962C8B-B14F-4D97-AF65-F5344CB8AC3E}">
-        <p14:creationId xmlns="" xmlns:p14="http://schemas.microsoft.com/office/powerpoint/2010/main" val="3654216826"/>
+        <p14:creationId xmlns:p14="http://schemas.microsoft.com/office/powerpoint/2010/main" xmlns="" val="3654216826"/>
       </p:ext>
     </p:extLst>
   </p:cSld>
@@ -5493,7 +5575,7 @@
     </p:spTree>
     <p:extLst>
       <p:ext uri="{BB962C8B-B14F-4D97-AF65-F5344CB8AC3E}">
-        <p14:creationId xmlns="" xmlns:p14="http://schemas.microsoft.com/office/powerpoint/2010/main" val="2837040887"/>
+        <p14:creationId xmlns:p14="http://schemas.microsoft.com/office/powerpoint/2010/main" xmlns="" val="2837040887"/>
       </p:ext>
     </p:extLst>
   </p:cSld>
@@ -5526,7 +5608,7 @@
     </p:spTree>
     <p:extLst>
       <p:ext uri="{BB962C8B-B14F-4D97-AF65-F5344CB8AC3E}">
-        <p14:creationId xmlns="" xmlns:p14="http://schemas.microsoft.com/office/powerpoint/2010/main" val="3283581558"/>
+        <p14:creationId xmlns:p14="http://schemas.microsoft.com/office/powerpoint/2010/main" xmlns="" val="3283581558"/>
       </p:ext>
     </p:extLst>
   </p:cSld>
@@ -5840,7 +5922,7 @@
     </p:spTree>
     <p:extLst>
       <p:ext uri="{BB962C8B-B14F-4D97-AF65-F5344CB8AC3E}">
-        <p14:creationId xmlns="" xmlns:p14="http://schemas.microsoft.com/office/powerpoint/2010/main" val="3151533342"/>
+        <p14:creationId xmlns:p14="http://schemas.microsoft.com/office/powerpoint/2010/main" xmlns="" val="3151533342"/>
       </p:ext>
     </p:extLst>
   </p:cSld>
@@ -5983,7 +6065,7 @@
     </p:spTree>
     <p:extLst>
       <p:ext uri="{BB962C8B-B14F-4D97-AF65-F5344CB8AC3E}">
-        <p14:creationId xmlns="" xmlns:p14="http://schemas.microsoft.com/office/powerpoint/2010/main" val="894352273"/>
+        <p14:creationId xmlns:p14="http://schemas.microsoft.com/office/powerpoint/2010/main" xmlns="" val="894352273"/>
       </p:ext>
     </p:extLst>
   </p:cSld>
@@ -6149,7 +6231,7 @@
     </p:spTree>
     <p:extLst>
       <p:ext uri="{BB962C8B-B14F-4D97-AF65-F5344CB8AC3E}">
-        <p14:creationId xmlns="" xmlns:p14="http://schemas.microsoft.com/office/powerpoint/2010/main" val="351067674"/>
+        <p14:creationId xmlns:p14="http://schemas.microsoft.com/office/powerpoint/2010/main" xmlns="" val="351067674"/>
       </p:ext>
     </p:extLst>
   </p:cSld>
@@ -6469,7 +6551,7 @@
     </p:spTree>
     <p:extLst>
       <p:ext uri="{BB962C8B-B14F-4D97-AF65-F5344CB8AC3E}">
-        <p14:creationId xmlns="" xmlns:p14="http://schemas.microsoft.com/office/powerpoint/2010/main" val="3938044995"/>
+        <p14:creationId xmlns:p14="http://schemas.microsoft.com/office/powerpoint/2010/main" xmlns="" val="3938044995"/>
       </p:ext>
     </p:extLst>
   </p:cSld>
@@ -7055,7 +7137,7 @@
     </p:spTree>
     <p:extLst>
       <p:ext uri="{BB962C8B-B14F-4D97-AF65-F5344CB8AC3E}">
-        <p14:creationId xmlns="" xmlns:p14="http://schemas.microsoft.com/office/powerpoint/2010/main" val="3192118728"/>
+        <p14:creationId xmlns:p14="http://schemas.microsoft.com/office/powerpoint/2010/main" xmlns="" val="3192118728"/>
       </p:ext>
     </p:extLst>
   </p:cSld>
@@ -7453,7 +7535,7 @@
     </p:spTree>
     <p:extLst>
       <p:ext uri="{BB962C8B-B14F-4D97-AF65-F5344CB8AC3E}">
-        <p14:creationId xmlns="" xmlns:p14="http://schemas.microsoft.com/office/powerpoint/2010/main" val="2190527855"/>
+        <p14:creationId xmlns:p14="http://schemas.microsoft.com/office/powerpoint/2010/main" xmlns="" val="2190527855"/>
       </p:ext>
     </p:extLst>
   </p:cSld>
@@ -8250,7 +8332,7 @@
     </p:spTree>
     <p:extLst>
       <p:ext uri="{BB962C8B-B14F-4D97-AF65-F5344CB8AC3E}">
-        <p14:creationId xmlns="" xmlns:p14="http://schemas.microsoft.com/office/powerpoint/2010/main" val="69886873"/>
+        <p14:creationId xmlns:p14="http://schemas.microsoft.com/office/powerpoint/2010/main" xmlns="" val="69886873"/>
       </p:ext>
     </p:extLst>
   </p:cSld>
@@ -9341,7 +9423,7 @@
     </p:spTree>
     <p:extLst>
       <p:ext uri="{BB962C8B-B14F-4D97-AF65-F5344CB8AC3E}">
-        <p14:creationId xmlns="" xmlns:p14="http://schemas.microsoft.com/office/powerpoint/2010/main" val="593901232"/>
+        <p14:creationId xmlns:p14="http://schemas.microsoft.com/office/powerpoint/2010/main" xmlns="" val="593901232"/>
       </p:ext>
     </p:extLst>
   </p:cSld>
@@ -9597,7 +9679,7 @@
     </p:spTree>
     <p:extLst>
       <p:ext uri="{BB962C8B-B14F-4D97-AF65-F5344CB8AC3E}">
-        <p14:creationId xmlns="" xmlns:p14="http://schemas.microsoft.com/office/powerpoint/2010/main" val="925662914"/>
+        <p14:creationId xmlns:p14="http://schemas.microsoft.com/office/powerpoint/2010/main" xmlns="" val="925662914"/>
       </p:ext>
     </p:extLst>
   </p:cSld>
@@ -9839,7 +9921,7 @@
     </p:spTree>
     <p:extLst>
       <p:ext uri="{BB962C8B-B14F-4D97-AF65-F5344CB8AC3E}">
-        <p14:creationId xmlns="" xmlns:p14="http://schemas.microsoft.com/office/powerpoint/2010/main" val="2463004899"/>
+        <p14:creationId xmlns:p14="http://schemas.microsoft.com/office/powerpoint/2010/main" xmlns="" val="2463004899"/>
       </p:ext>
     </p:extLst>
   </p:cSld>
@@ -10260,7 +10342,15 @@
           <a:p>
             <a:r>
               <a:rPr lang="nb-NO" dirty="0" smtClean="0"/>
-              <a:t>August 2012</a:t>
+              <a:t>September</a:t>
+            </a:r>
+            <a:r>
+              <a:rPr lang="nb-NO" dirty="0" smtClean="0"/>
+              <a:t> </a:t>
+            </a:r>
+            <a:r>
+              <a:rPr lang="nb-NO" dirty="0" smtClean="0"/>
+              <a:t>2012</a:t>
             </a:r>
             <a:endParaRPr lang="en-US" dirty="0"/>
           </a:p>
@@ -10269,7 +10359,7 @@
     </p:spTree>
     <p:extLst>
       <p:ext uri="{BB962C8B-B14F-4D97-AF65-F5344CB8AC3E}">
-        <p14:creationId xmlns="" xmlns:p14="http://schemas.microsoft.com/office/powerpoint/2010/main" val="1193520387"/>
+        <p14:creationId xmlns:p14="http://schemas.microsoft.com/office/powerpoint/2010/main" xmlns="" val="1193520387"/>
       </p:ext>
     </p:extLst>
   </p:cSld>
@@ -10408,11 +10498,7 @@
             </a:pPr>
             <a:r>
               <a:rPr lang="nb-NO" sz="1400" dirty="0" smtClean="0"/>
-              <a:t> </a:t>
-            </a:r>
-            <a:r>
-              <a:rPr lang="nb-NO" sz="1400" dirty="0" smtClean="0"/>
-              <a:t>Bruke LINQ  til å kjøre spørringer mot enumerable objekter i ADO.NET </a:t>
+              <a:t> Bruke LINQ  til å kjøre spørringer mot enumerable objekter i ADO.NET </a:t>
             </a:r>
           </a:p>
           <a:p>
@@ -10484,7 +10570,6 @@
               <a:rPr lang="nb-NO" sz="1400" dirty="0" smtClean="0"/>
               <a:t>LINQ to Entities</a:t>
             </a:r>
-            <a:endParaRPr lang="nb-NO" sz="1400" dirty="0" smtClean="0"/>
           </a:p>
         </p:txBody>
       </p:sp>
@@ -11644,17 +11729,7 @@
                 <a:latin typeface="Consolas" pitchFamily="49" charset="0"/>
                 <a:cs typeface="Consolas" pitchFamily="49" charset="0"/>
               </a:rPr>
-              <a:t>	</a:t>
-            </a:r>
-            <a:r>
-              <a:rPr lang="en-US" sz="1100" dirty="0" smtClean="0">
-                <a:solidFill>
-                  <a:srgbClr val="000000"/>
-                </a:solidFill>
-                <a:latin typeface="Consolas" pitchFamily="49" charset="0"/>
-                <a:cs typeface="Consolas" pitchFamily="49" charset="0"/>
-              </a:rPr>
-              <a:t>	       </a:t>
+              <a:t>		       </a:t>
             </a:r>
             <a:r>
               <a:rPr kumimoji="0" lang="en-US" sz="1100" b="0" i="0" u="none" strike="noStrike" cap="none" normalizeH="0" baseline="0" dirty="0" smtClean="0">
@@ -11738,17 +11813,7 @@
                 <a:latin typeface="Consolas" pitchFamily="49" charset="0"/>
                 <a:cs typeface="Consolas" pitchFamily="49" charset="0"/>
               </a:rPr>
-              <a:t>	</a:t>
-            </a:r>
-            <a:r>
-              <a:rPr lang="en-US" sz="1100" dirty="0" smtClean="0">
-                <a:solidFill>
-                  <a:srgbClr val="000000"/>
-                </a:solidFill>
-                <a:latin typeface="Consolas" pitchFamily="49" charset="0"/>
-                <a:cs typeface="Consolas" pitchFamily="49" charset="0"/>
-              </a:rPr>
-              <a:t>	       </a:t>
+              <a:t>		       </a:t>
             </a:r>
             <a:r>
               <a:rPr kumimoji="0" lang="en-US" sz="1100" b="0" i="0" u="none" strike="noStrike" cap="none" normalizeH="0" baseline="0" dirty="0" smtClean="0">
@@ -11832,17 +11897,7 @@
                 <a:latin typeface="Consolas" pitchFamily="49" charset="0"/>
                 <a:cs typeface="Consolas" pitchFamily="49" charset="0"/>
               </a:rPr>
-              <a:t>	</a:t>
-            </a:r>
-            <a:r>
-              <a:rPr lang="en-US" sz="1100" dirty="0" smtClean="0">
-                <a:solidFill>
-                  <a:srgbClr val="000000"/>
-                </a:solidFill>
-                <a:latin typeface="Consolas" pitchFamily="49" charset="0"/>
-                <a:cs typeface="Consolas" pitchFamily="49" charset="0"/>
-              </a:rPr>
-              <a:t>	      </a:t>
+              <a:t>		      </a:t>
             </a:r>
             <a:r>
               <a:rPr kumimoji="0" lang="en-US" sz="1100" b="0" i="0" u="none" strike="noStrike" cap="none" normalizeH="0" baseline="0" dirty="0" smtClean="0">
@@ -12115,7 +12170,6 @@
               <a:rPr lang="nb-NO" sz="1400" dirty="0" smtClean="0"/>
               <a:t>Hente ut:</a:t>
             </a:r>
-            <a:endParaRPr lang="nb-NO" sz="1400" dirty="0" smtClean="0"/>
           </a:p>
         </p:txBody>
       </p:sp>
@@ -12153,7 +12207,6 @@
               <a:rPr lang="nb-NO" sz="1400" dirty="0" smtClean="0"/>
               <a:t>Sette inn:</a:t>
             </a:r>
-            <a:endParaRPr lang="nb-NO" sz="1400" dirty="0" smtClean="0"/>
           </a:p>
         </p:txBody>
       </p:sp>
@@ -12191,7 +12244,6 @@
               <a:rPr lang="nb-NO" sz="1400" dirty="0" smtClean="0"/>
               <a:t>Slette:</a:t>
             </a:r>
-            <a:endParaRPr lang="nb-NO" sz="1400" dirty="0" smtClean="0"/>
           </a:p>
         </p:txBody>
       </p:sp>
@@ -12528,17 +12580,7 @@
                 <a:latin typeface="Consolas" pitchFamily="49" charset="0"/>
                 <a:cs typeface="Consolas" pitchFamily="49" charset="0"/>
               </a:rPr>
-              <a:t> </a:t>
-            </a:r>
-            <a:r>
-              <a:rPr lang="en-US" sz="1100" dirty="0" smtClean="0">
-                <a:solidFill>
-                  <a:srgbClr val="000000"/>
-                </a:solidFill>
-                <a:latin typeface="Consolas" pitchFamily="49" charset="0"/>
-                <a:cs typeface="Consolas" pitchFamily="49" charset="0"/>
-              </a:rPr>
-              <a:t>                              </a:t>
+              <a:t>                               </a:t>
             </a:r>
             <a:r>
               <a:rPr kumimoji="0" lang="en-US" sz="1100" b="0" i="0" u="none" strike="noStrike" cap="none" normalizeH="0" baseline="0" dirty="0" smtClean="0">
@@ -12817,7 +12859,6 @@
               <a:rPr lang="nb-NO" sz="1400" dirty="0" smtClean="0"/>
               <a:t>Oppdatere</a:t>
             </a:r>
-            <a:endParaRPr lang="nb-NO" sz="1400" dirty="0" smtClean="0"/>
           </a:p>
         </p:txBody>
       </p:sp>
@@ -12829,6 +12870,13 @@
   <p:transition>
     <p:fade thruBlk="1"/>
   </p:transition>
+  <p:timing>
+    <p:tnLst>
+      <p:par>
+        <p:cTn id="1" dur="indefinite" restart="never" nodeType="tmRoot"/>
+      </p:par>
+    </p:tnLst>
+  </p:timing>
 </p:sld>
 </file>
 
@@ -12951,13 +12999,8 @@
             </a:pPr>
             <a:r>
               <a:rPr lang="nb-NO" sz="1400" dirty="0" smtClean="0"/>
-              <a:t> </a:t>
-            </a:r>
-            <a:r>
-              <a:rPr lang="nb-NO" sz="1400" dirty="0" smtClean="0"/>
-              <a:t>Ansvarlig for oversettelse mellom LINQ og T-SQL, samt mapping av resultater</a:t>
-            </a:r>
-            <a:endParaRPr lang="nb-NO" sz="1400" dirty="0" smtClean="0"/>
+              <a:t> Ansvarlig for oversettelse mellom LINQ og T-SQL, samt mapping av resultater</a:t>
+            </a:r>
           </a:p>
           <a:p>
             <a:pPr>
@@ -12999,11 +13042,7 @@
             </a:pPr>
             <a:r>
               <a:rPr lang="nb-NO" sz="1400" dirty="0" smtClean="0"/>
-              <a:t> </a:t>
-            </a:r>
-            <a:r>
-              <a:rPr lang="nb-NO" sz="1400" dirty="0" smtClean="0"/>
-              <a:t>Koble til databasen</a:t>
+              <a:t> Koble til databasen</a:t>
             </a:r>
           </a:p>
           <a:p>
@@ -13019,11 +13058,7 @@
             </a:pPr>
             <a:r>
               <a:rPr lang="nb-NO" sz="1400" dirty="0" smtClean="0"/>
-              <a:t> </a:t>
-            </a:r>
-            <a:r>
-              <a:rPr lang="nb-NO" sz="1400" dirty="0" smtClean="0"/>
-              <a:t>Aksessere data</a:t>
+              <a:t> Aksessere data</a:t>
             </a:r>
           </a:p>
           <a:p>
@@ -13039,13 +13074,8 @@
             </a:pPr>
             <a:r>
               <a:rPr lang="nb-NO" sz="1400" dirty="0" smtClean="0"/>
-              <a:t> </a:t>
-            </a:r>
-            <a:r>
-              <a:rPr lang="nb-NO" sz="1400" dirty="0" smtClean="0"/>
-              <a:t>Sende endringer tilbake til serveren</a:t>
-            </a:r>
-            <a:endParaRPr lang="nb-NO" sz="1400" dirty="0" smtClean="0"/>
+              <a:t> Sende endringer tilbake til serveren</a:t>
+            </a:r>
           </a:p>
         </p:txBody>
       </p:sp>
@@ -13394,7 +13424,6 @@
               <a:rPr lang="nb-NO" sz="1400" i="1" dirty="0" smtClean="0"/>
               <a:t>get it as late as possible and get rid of it as soon as you can</a:t>
             </a:r>
-            <a:endParaRPr lang="nb-NO" sz="1400" i="1" dirty="0" smtClean="0"/>
           </a:p>
         </p:txBody>
       </p:sp>
@@ -13406,6 +13435,13 @@
   <p:transition>
     <p:fade thruBlk="1"/>
   </p:transition>
+  <p:timing>
+    <p:tnLst>
+      <p:par>
+        <p:cTn id="1" dur="indefinite" restart="never" nodeType="tmRoot"/>
+      </p:par>
+    </p:tnLst>
+  </p:timing>
 </p:sld>
 </file>
 
@@ -13538,15 +13574,7 @@
                   <a:schemeClr val="bg1"/>
                 </a:solidFill>
               </a:rPr>
-              <a:t>Denne oppgaven er innholdsmessig lik som den forrige, eneste forskjell er at vi nå skal løse den ved hjelp av LINQ to SQL.</a:t>
-            </a:r>
-            <a:r>
-              <a:rPr lang="nb-NO" dirty="0" smtClean="0">
-                <a:solidFill>
-                  <a:schemeClr val="bg1"/>
-                </a:solidFill>
-              </a:rPr>
-              <a:t> </a:t>
+              <a:t>Denne oppgaven er innholdsmessig lik som den forrige, eneste forskjell er at vi nå skal løse den ved hjelp av LINQ to SQL. </a:t>
             </a:r>
             <a:endParaRPr lang="nb-NO" sz="1200" i="1" dirty="0" smtClean="0">
               <a:solidFill>
@@ -13677,13 +13705,8 @@
             </a:pPr>
             <a:r>
               <a:rPr lang="nb-NO" sz="1400" dirty="0" smtClean="0"/>
-              <a:t> Open-source </a:t>
-            </a:r>
-            <a:r>
-              <a:rPr lang="nb-NO" sz="1400" dirty="0" smtClean="0"/>
-              <a:t>ORM for .NET rammeverket</a:t>
-            </a:r>
-            <a:endParaRPr lang="nb-NO" sz="1400" dirty="0" smtClean="0"/>
+              <a:t> Open-source ORM for .NET rammeverket</a:t>
+            </a:r>
           </a:p>
           <a:p>
             <a:pPr>
@@ -14163,17 +14186,6 @@
               </a:rPr>
               <a:t>{             </a:t>
             </a:r>
-            <a:endParaRPr kumimoji="0" lang="en-US" sz="900" b="0" i="0" u="none" strike="noStrike" cap="none" normalizeH="0" baseline="0" dirty="0" smtClean="0">
-              <a:ln>
-                <a:noFill/>
-              </a:ln>
-              <a:solidFill>
-                <a:srgbClr val="000000"/>
-              </a:solidFill>
-              <a:effectLst/>
-              <a:latin typeface="Consolas" pitchFamily="49" charset="0"/>
-              <a:cs typeface="Consolas" pitchFamily="49" charset="0"/>
-            </a:endParaRPr>
           </a:p>
           <a:p>
             <a:pPr defTabSz="914400" fontAlgn="base">
@@ -14192,17 +14204,7 @@
                 <a:latin typeface="Consolas" pitchFamily="49" charset="0"/>
                 <a:cs typeface="Consolas" pitchFamily="49" charset="0"/>
               </a:rPr>
-              <a:t>	public </a:t>
-            </a:r>
-            <a:r>
-              <a:rPr lang="en-US" sz="900" dirty="0" smtClean="0">
-                <a:solidFill>
-                  <a:srgbClr val="0000FF"/>
-                </a:solidFill>
-                <a:latin typeface="Consolas" pitchFamily="49" charset="0"/>
-                <a:cs typeface="Consolas" pitchFamily="49" charset="0"/>
-              </a:rPr>
-              <a:t>virtual</a:t>
+              <a:t>	public virtual</a:t>
             </a:r>
             <a:r>
               <a:rPr lang="en-US" sz="900" dirty="0" smtClean="0">
@@ -14236,27 +14238,7 @@
                 <a:latin typeface="Consolas" pitchFamily="49" charset="0"/>
                 <a:cs typeface="Consolas" pitchFamily="49" charset="0"/>
               </a:rPr>
-              <a:t> </a:t>
-            </a:r>
-            <a:r>
-              <a:rPr lang="en-US" sz="900" dirty="0" smtClean="0">
-                <a:solidFill>
-                  <a:srgbClr val="000000"/>
-                </a:solidFill>
-                <a:latin typeface="Consolas" pitchFamily="49" charset="0"/>
-                <a:cs typeface="Consolas" pitchFamily="49" charset="0"/>
-              </a:rPr>
-              <a:t>Id</a:t>
-            </a:r>
-            <a:r>
-              <a:rPr lang="en-US" sz="900" dirty="0" smtClean="0">
-                <a:solidFill>
-                  <a:srgbClr val="000000"/>
-                </a:solidFill>
-                <a:latin typeface="Consolas" pitchFamily="49" charset="0"/>
-                <a:cs typeface="Consolas" pitchFamily="49" charset="0"/>
-              </a:rPr>
-              <a:t> { </a:t>
+              <a:t> Id { </a:t>
             </a:r>
             <a:r>
               <a:rPr lang="en-US" sz="900" dirty="0" smtClean="0">
@@ -14712,11 +14694,7 @@
             </a:pPr>
             <a:r>
               <a:rPr lang="nb-NO" sz="1400" dirty="0" smtClean="0"/>
-              <a:t>2. Definere mappingen (&lt;className&gt;.hbm.xml</a:t>
-            </a:r>
-            <a:r>
-              <a:rPr lang="nb-NO" sz="1400" dirty="0" smtClean="0"/>
-              <a:t>)</a:t>
+              <a:t>2. Definere mappingen (&lt;className&gt;.hbm.xml)</a:t>
             </a:r>
             <a:br>
               <a:rPr lang="nb-NO" sz="1400" dirty="0" smtClean="0"/>
@@ -14814,7 +14792,6 @@
               <a:rPr lang="nb-NO" sz="1400" i="1" dirty="0" smtClean="0"/>
               <a:t>Embedded Resource</a:t>
             </a:r>
-            <a:endParaRPr lang="nb-NO" sz="1400" i="1" dirty="0" smtClean="0"/>
           </a:p>
           <a:p>
             <a:pPr>
@@ -18594,11 +18571,7 @@
             </a:pPr>
             <a:r>
               <a:rPr lang="nb-NO" sz="1400" dirty="0" smtClean="0"/>
-              <a:t>5. Opprett en test som verifiserer at alt er satt opp </a:t>
-            </a:r>
-            <a:r>
-              <a:rPr lang="nb-NO" sz="1400" dirty="0" smtClean="0"/>
-              <a:t>riktig</a:t>
+              <a:t>5. Opprett en test som verifiserer at alt er satt opp riktig</a:t>
             </a:r>
           </a:p>
           <a:p>
@@ -18663,21 +18636,8 @@
             </a:br>
             <a:r>
               <a:rPr lang="nb-NO" sz="1100" dirty="0" smtClean="0"/>
-              <a:t>Testprosjektet må ha referanse </a:t>
-            </a:r>
-            <a:r>
-              <a:rPr lang="nb-NO" sz="1100" dirty="0" smtClean="0"/>
-              <a:t>til NHibernate.dll, Iesi.Collections.dll, </a:t>
-            </a:r>
-            <a:r>
-              <a:rPr lang="nb-NO" sz="1100" dirty="0" smtClean="0"/>
-              <a:t>System.Data.SqlServerCe.dll </a:t>
-            </a:r>
-            <a:r>
-              <a:rPr lang="nb-NO" sz="1100" dirty="0" smtClean="0"/>
-              <a:t>i tillegg til selve prosjektet</a:t>
-            </a:r>
-            <a:endParaRPr lang="nb-NO" sz="1100" dirty="0" smtClean="0"/>
+              <a:t>Testprosjektet må ha referanse til NHibernate.dll, Iesi.Collections.dll, System.Data.SqlServerCe.dll i tillegg til selve prosjektet</a:t>
+            </a:r>
           </a:p>
           <a:p>
             <a:pPr>
@@ -22184,6 +22144,13 @@
   <p:transition>
     <p:fade thruBlk="1"/>
   </p:transition>
+  <p:timing>
+    <p:tnLst>
+      <p:par>
+        <p:cTn id="1" dur="indefinite" restart="never" nodeType="tmRoot"/>
+      </p:par>
+    </p:tnLst>
+  </p:timing>
 </p:sld>
 </file>
 
@@ -22435,11 +22402,7 @@
             </a:pPr>
             <a:r>
               <a:rPr lang="nb-NO" sz="1400" dirty="0" smtClean="0"/>
-              <a:t>Object Relational </a:t>
-            </a:r>
-            <a:r>
-              <a:rPr lang="nb-NO" sz="1400" dirty="0" smtClean="0"/>
-              <a:t>Mapping</a:t>
+              <a:t>Object Relational Mapping</a:t>
             </a:r>
           </a:p>
           <a:p>
@@ -22455,13 +22418,8 @@
             </a:pPr>
             <a:r>
               <a:rPr lang="nb-NO" sz="1400" dirty="0" smtClean="0"/>
-              <a:t> </a:t>
-            </a:r>
-            <a:r>
-              <a:rPr lang="nb-NO" sz="1400" dirty="0" smtClean="0"/>
-              <a:t>LINQ To...</a:t>
-            </a:r>
-            <a:endParaRPr lang="nb-NO" sz="1400" dirty="0" smtClean="0"/>
+              <a:t> LINQ To...</a:t>
+            </a:r>
           </a:p>
           <a:p>
             <a:pPr lvl="1">
@@ -22973,15 +22931,7 @@
                   <a:schemeClr val="bg1"/>
                 </a:solidFill>
               </a:rPr>
-              <a:t>Prøv å gjennomføre denne oppgaven </a:t>
-            </a:r>
-            <a:r>
-              <a:rPr lang="nb-NO" dirty="0" smtClean="0">
-                <a:solidFill>
-                  <a:schemeClr val="bg1"/>
-                </a:solidFill>
-              </a:rPr>
-              <a:t>test-først</a:t>
+              <a:t>Prøv å gjennomføre denne oppgaven test-først</a:t>
             </a:r>
           </a:p>
           <a:p>
@@ -23012,21 +22962,8 @@
                   <a:schemeClr val="bg1"/>
                 </a:solidFill>
               </a:rPr>
-              <a:t>Hint: </a:t>
-            </a:r>
-            <a:r>
-              <a:rPr lang="nb-NO" sz="1100" i="1" dirty="0" smtClean="0">
-                <a:solidFill>
-                  <a:schemeClr val="bg1"/>
-                </a:solidFill>
-              </a:rPr>
-              <a:t>For å kunne verifisere at noe er lagret i databasen, kan det være nødvendig å opprette en sessionFactory som kan brukes av testene for å gjøre spørringer mot databasen utenom repository. Denne bør kun initialiseres èn gang, en idè kan være å bruke [ClassInitialize] attributten for å få til dette innenfor en testklasse.</a:t>
-            </a:r>
-            <a:endParaRPr lang="nb-NO" sz="1100" i="1" dirty="0" smtClean="0">
-              <a:solidFill>
-                <a:schemeClr val="bg1"/>
-              </a:solidFill>
-            </a:endParaRPr>
+              <a:t>Hint: For å kunne verifisere at noe er lagret i databasen, kan det være nødvendig å opprette en sessionFactory som kan brukes av testene for å gjøre spørringer mot databasen utenom repository. Denne bør kun initialiseres èn gang, en idè kan være å bruke [ClassInitialize] attributten for å få til dette innenfor en testklasse.</a:t>
+            </a:r>
           </a:p>
           <a:p>
             <a:pPr marL="342900" indent="-342900" algn="just"/>
@@ -23386,6 +23323,13 @@
   <p:transition>
     <p:fade thruBlk="1"/>
   </p:transition>
+  <p:timing>
+    <p:tnLst>
+      <p:par>
+        <p:cTn id="1" dur="indefinite" restart="never" nodeType="tmRoot"/>
+      </p:par>
+    </p:tnLst>
+  </p:timing>
 </p:sld>
 </file>
 
@@ -23769,15 +23713,7 @@
             </a:pPr>
             <a:r>
               <a:rPr lang="nb-NO" sz="1400" dirty="0" smtClean="0"/>
-              <a:t> Aksessere forskjellig </a:t>
-            </a:r>
-            <a:r>
-              <a:rPr lang="nb-NO" sz="1400" dirty="0" smtClean="0"/>
-              <a:t>typer </a:t>
-            </a:r>
-            <a:r>
-              <a:rPr lang="nb-NO" sz="1400" dirty="0" smtClean="0"/>
-              <a:t>data med de samme metodene (SQL, Oracle, MS Access)</a:t>
+              <a:t> Aksessere forskjellig typer data med de samme metodene (SQL, Oracle, MS Access)</a:t>
             </a:r>
           </a:p>
           <a:p>
@@ -23793,8 +23729,13 @@
             </a:pPr>
             <a:r>
               <a:rPr lang="nb-NO" sz="1400" dirty="0" smtClean="0"/>
-              <a:t> Viktig å kjenne til selv om mange i dag benytter seg av ORM </a:t>
-            </a:r>
+              <a:t> Viktig å kjenne til selv om mange i dag benytter seg av </a:t>
+            </a:r>
+            <a:r>
+              <a:rPr lang="nb-NO" sz="1400" dirty="0" smtClean="0"/>
+              <a:t>en Object Relation Mapper (ORM) </a:t>
+            </a:r>
+            <a:endParaRPr lang="nb-NO" sz="1400" dirty="0" smtClean="0"/>
           </a:p>
           <a:p>
             <a:pPr>
@@ -24394,6 +24335,13 @@
   <p:transition>
     <p:fade thruBlk="1"/>
   </p:transition>
+  <p:timing>
+    <p:tnLst>
+      <p:par>
+        <p:cTn id="1" dur="indefinite" restart="never" nodeType="tmRoot"/>
+      </p:par>
+    </p:tnLst>
+  </p:timing>
 </p:sld>
 </file>
 
@@ -25053,6 +25001,13 @@
   <p:transition>
     <p:fade thruBlk="1"/>
   </p:transition>
+  <p:timing>
+    <p:tnLst>
+      <p:par>
+        <p:cTn id="1" dur="indefinite" restart="never" nodeType="tmRoot"/>
+      </p:par>
+    </p:tnLst>
+  </p:timing>
 </p:sld>
 </file>
 
@@ -26941,6 +26896,13 @@
   <p:transition>
     <p:fade thruBlk="1"/>
   </p:transition>
+  <p:timing>
+    <p:tnLst>
+      <p:par>
+        <p:cTn id="1" dur="indefinite" restart="never" nodeType="tmRoot"/>
+      </p:par>
+    </p:tnLst>
+  </p:timing>
 </p:sld>
 </file>
 
@@ -28712,7 +28674,7 @@
                 <a:latin typeface="Consolas" pitchFamily="49" charset="0"/>
                 <a:cs typeface="Consolas" pitchFamily="49" charset="0"/>
               </a:rPr>
-              <a:t>connectionString</a:t>
+              <a:t>connection</a:t>
             </a:r>
             <a:r>
               <a:rPr lang="en-US" sz="1200" dirty="0" err="1" smtClean="0">
@@ -30240,15 +30202,7 @@
             </a:pPr>
             <a:r>
               <a:rPr lang="nb-NO" sz="1400" dirty="0" smtClean="0"/>
-              <a:t> </a:t>
-            </a:r>
-            <a:r>
-              <a:rPr lang="nb-NO" sz="1400" dirty="0" smtClean="0"/>
-              <a:t>ADO.NET Entity </a:t>
-            </a:r>
-            <a:r>
-              <a:rPr lang="nb-NO" sz="1400" dirty="0" smtClean="0"/>
-              <a:t>Framework</a:t>
+              <a:t> ADO.NET Entity Framework</a:t>
             </a:r>
           </a:p>
           <a:p>
@@ -30264,11 +30218,7 @@
             </a:pPr>
             <a:r>
               <a:rPr lang="nb-NO" sz="1400" dirty="0" smtClean="0"/>
-              <a:t> </a:t>
-            </a:r>
-            <a:r>
-              <a:rPr lang="nb-NO" sz="1400" dirty="0" smtClean="0"/>
-              <a:t>NHibernate</a:t>
+              <a:t> NHibernate</a:t>
             </a:r>
           </a:p>
           <a:p>
@@ -30361,7 +30311,6 @@
               <a:rPr lang="nb-NO" sz="1400" dirty="0" smtClean="0"/>
               <a:t>Optimistic offline lock</a:t>
             </a:r>
-            <a:endParaRPr lang="nb-NO" sz="1400" dirty="0" smtClean="0"/>
           </a:p>
           <a:p>
             <a:pPr marL="342900" indent="-342900">
@@ -30378,7 +30327,6 @@
               <a:rPr lang="nb-NO" sz="1400" dirty="0" smtClean="0"/>
               <a:t>Data mapper</a:t>
             </a:r>
-            <a:endParaRPr lang="nb-NO" sz="1400" dirty="0" smtClean="0"/>
           </a:p>
         </p:txBody>
       </p:sp>

</xml_diff>